<commit_message>
Update css files structure and caution.html
</commit_message>
<xml_diff>
--- a/etc/오시는 길.pptx
+++ b/etc/오시는 길.pptx
@@ -4,11 +4,16 @@
   <p:sldMasterIdLst>
     <p:sldMasterId id="2147483648" r:id="rId1"/>
   </p:sldMasterIdLst>
+  <p:notesMasterIdLst>
+    <p:notesMasterId r:id="rId8"/>
+  </p:notesMasterIdLst>
   <p:sldIdLst>
     <p:sldId id="256" r:id="rId2"/>
     <p:sldId id="257" r:id="rId3"/>
     <p:sldId id="258" r:id="rId4"/>
     <p:sldId id="259" r:id="rId5"/>
+    <p:sldId id="260" r:id="rId6"/>
+    <p:sldId id="261" r:id="rId7"/>
   </p:sldIdLst>
   <p:sldSz cx="12192000" cy="6858000"/>
   <p:notesSz cx="6858000" cy="9144000"/>
@@ -115,6 +120,444 @@
 </p:presentation>
 </file>
 
+<file path=ppt/notesMasters/notesMaster1.xml><?xml version="1.0" encoding="utf-8"?>
+<p:notesMaster xmlns:a="http://schemas.openxmlformats.org/drawingml/2006/main" xmlns:r="http://schemas.openxmlformats.org/officeDocument/2006/relationships" xmlns:p="http://schemas.openxmlformats.org/presentationml/2006/main">
+  <p:cSld>
+    <p:bg>
+      <p:bgRef idx="1001">
+        <a:schemeClr val="bg1"/>
+      </p:bgRef>
+    </p:bg>
+    <p:spTree>
+      <p:nvGrpSpPr>
+        <p:cNvPr id="1" name=""/>
+        <p:cNvGrpSpPr/>
+        <p:nvPr/>
+      </p:nvGrpSpPr>
+      <p:grpSpPr>
+        <a:xfrm>
+          <a:off x="0" y="0"/>
+          <a:ext cx="0" cy="0"/>
+          <a:chOff x="0" y="0"/>
+          <a:chExt cx="0" cy="0"/>
+        </a:xfrm>
+      </p:grpSpPr>
+      <p:sp>
+        <p:nvSpPr>
+          <p:cNvPr id="2" name="머리글 개체 틀 1"/>
+          <p:cNvSpPr>
+            <a:spLocks noGrp="1"/>
+          </p:cNvSpPr>
+          <p:nvPr>
+            <p:ph type="hdr" sz="quarter"/>
+          </p:nvPr>
+        </p:nvSpPr>
+        <p:spPr>
+          <a:xfrm>
+            <a:off x="0" y="0"/>
+            <a:ext cx="2971800" cy="458788"/>
+          </a:xfrm>
+          <a:prstGeom prst="rect">
+            <a:avLst/>
+          </a:prstGeom>
+        </p:spPr>
+        <p:txBody>
+          <a:bodyPr vert="horz" lIns="91440" tIns="45720" rIns="91440" bIns="45720" rtlCol="0"/>
+          <a:lstStyle>
+            <a:lvl1pPr algn="l">
+              <a:defRPr sz="1200"/>
+            </a:lvl1pPr>
+          </a:lstStyle>
+          <a:p>
+            <a:endParaRPr lang="ko-KR" altLang="en-US"/>
+          </a:p>
+        </p:txBody>
+      </p:sp>
+      <p:sp>
+        <p:nvSpPr>
+          <p:cNvPr id="3" name="날짜 개체 틀 2"/>
+          <p:cNvSpPr>
+            <a:spLocks noGrp="1"/>
+          </p:cNvSpPr>
+          <p:nvPr>
+            <p:ph type="dt" idx="1"/>
+          </p:nvPr>
+        </p:nvSpPr>
+        <p:spPr>
+          <a:xfrm>
+            <a:off x="3884613" y="0"/>
+            <a:ext cx="2971800" cy="458788"/>
+          </a:xfrm>
+          <a:prstGeom prst="rect">
+            <a:avLst/>
+          </a:prstGeom>
+        </p:spPr>
+        <p:txBody>
+          <a:bodyPr vert="horz" lIns="91440" tIns="45720" rIns="91440" bIns="45720" rtlCol="0"/>
+          <a:lstStyle>
+            <a:lvl1pPr algn="r">
+              <a:defRPr sz="1200"/>
+            </a:lvl1pPr>
+          </a:lstStyle>
+          <a:p>
+            <a:fld id="{139648A1-A24F-42F9-8C7C-B502D04BA66D}" type="datetimeFigureOut">
+              <a:rPr lang="ko-KR" altLang="en-US" smtClean="0"/>
+              <a:t>2020-01-16</a:t>
+            </a:fld>
+            <a:endParaRPr lang="ko-KR" altLang="en-US"/>
+          </a:p>
+        </p:txBody>
+      </p:sp>
+      <p:sp>
+        <p:nvSpPr>
+          <p:cNvPr id="4" name="슬라이드 이미지 개체 틀 3"/>
+          <p:cNvSpPr>
+            <a:spLocks noGrp="1" noRot="1" noChangeAspect="1"/>
+          </p:cNvSpPr>
+          <p:nvPr>
+            <p:ph type="sldImg" idx="2"/>
+          </p:nvPr>
+        </p:nvSpPr>
+        <p:spPr>
+          <a:xfrm>
+            <a:off x="685800" y="1143000"/>
+            <a:ext cx="5486400" cy="3086100"/>
+          </a:xfrm>
+          <a:prstGeom prst="rect">
+            <a:avLst/>
+          </a:prstGeom>
+          <a:noFill/>
+          <a:ln w="12700">
+            <a:solidFill>
+              <a:prstClr val="black"/>
+            </a:solidFill>
+          </a:ln>
+        </p:spPr>
+        <p:txBody>
+          <a:bodyPr vert="horz" lIns="91440" tIns="45720" rIns="91440" bIns="45720" rtlCol="0" anchor="ctr"/>
+          <a:lstStyle/>
+          <a:p>
+            <a:endParaRPr lang="ko-KR" altLang="en-US"/>
+          </a:p>
+        </p:txBody>
+      </p:sp>
+      <p:sp>
+        <p:nvSpPr>
+          <p:cNvPr id="5" name="슬라이드 노트 개체 틀 4"/>
+          <p:cNvSpPr>
+            <a:spLocks noGrp="1"/>
+          </p:cNvSpPr>
+          <p:nvPr>
+            <p:ph type="body" sz="quarter" idx="3"/>
+          </p:nvPr>
+        </p:nvSpPr>
+        <p:spPr>
+          <a:xfrm>
+            <a:off x="685800" y="4400550"/>
+            <a:ext cx="5486400" cy="3600450"/>
+          </a:xfrm>
+          <a:prstGeom prst="rect">
+            <a:avLst/>
+          </a:prstGeom>
+        </p:spPr>
+        <p:txBody>
+          <a:bodyPr vert="horz" lIns="91440" tIns="45720" rIns="91440" bIns="45720" rtlCol="0"/>
+          <a:lstStyle/>
+          <a:p>
+            <a:pPr lvl="0"/>
+            <a:r>
+              <a:rPr lang="ko-KR" altLang="en-US"/>
+              <a:t>마스터 텍스트 스타일을 편집하려면 클릭</a:t>
+            </a:r>
+          </a:p>
+          <a:p>
+            <a:pPr lvl="1"/>
+            <a:r>
+              <a:rPr lang="ko-KR" altLang="en-US"/>
+              <a:t>두 번째 수준</a:t>
+            </a:r>
+          </a:p>
+          <a:p>
+            <a:pPr lvl="2"/>
+            <a:r>
+              <a:rPr lang="ko-KR" altLang="en-US"/>
+              <a:t>세 번째 수준</a:t>
+            </a:r>
+          </a:p>
+          <a:p>
+            <a:pPr lvl="3"/>
+            <a:r>
+              <a:rPr lang="ko-KR" altLang="en-US"/>
+              <a:t>네 번째 수준</a:t>
+            </a:r>
+          </a:p>
+          <a:p>
+            <a:pPr lvl="4"/>
+            <a:r>
+              <a:rPr lang="ko-KR" altLang="en-US"/>
+              <a:t>다섯 번째 수준</a:t>
+            </a:r>
+          </a:p>
+        </p:txBody>
+      </p:sp>
+      <p:sp>
+        <p:nvSpPr>
+          <p:cNvPr id="6" name="바닥글 개체 틀 5"/>
+          <p:cNvSpPr>
+            <a:spLocks noGrp="1"/>
+          </p:cNvSpPr>
+          <p:nvPr>
+            <p:ph type="ftr" sz="quarter" idx="4"/>
+          </p:nvPr>
+        </p:nvSpPr>
+        <p:spPr>
+          <a:xfrm>
+            <a:off x="0" y="8685213"/>
+            <a:ext cx="2971800" cy="458787"/>
+          </a:xfrm>
+          <a:prstGeom prst="rect">
+            <a:avLst/>
+          </a:prstGeom>
+        </p:spPr>
+        <p:txBody>
+          <a:bodyPr vert="horz" lIns="91440" tIns="45720" rIns="91440" bIns="45720" rtlCol="0" anchor="b"/>
+          <a:lstStyle>
+            <a:lvl1pPr algn="l">
+              <a:defRPr sz="1200"/>
+            </a:lvl1pPr>
+          </a:lstStyle>
+          <a:p>
+            <a:endParaRPr lang="ko-KR" altLang="en-US"/>
+          </a:p>
+        </p:txBody>
+      </p:sp>
+      <p:sp>
+        <p:nvSpPr>
+          <p:cNvPr id="7" name="슬라이드 번호 개체 틀 6"/>
+          <p:cNvSpPr>
+            <a:spLocks noGrp="1"/>
+          </p:cNvSpPr>
+          <p:nvPr>
+            <p:ph type="sldNum" sz="quarter" idx="5"/>
+          </p:nvPr>
+        </p:nvSpPr>
+        <p:spPr>
+          <a:xfrm>
+            <a:off x="3884613" y="8685213"/>
+            <a:ext cx="2971800" cy="458787"/>
+          </a:xfrm>
+          <a:prstGeom prst="rect">
+            <a:avLst/>
+          </a:prstGeom>
+        </p:spPr>
+        <p:txBody>
+          <a:bodyPr vert="horz" lIns="91440" tIns="45720" rIns="91440" bIns="45720" rtlCol="0" anchor="b"/>
+          <a:lstStyle>
+            <a:lvl1pPr algn="r">
+              <a:defRPr sz="1200"/>
+            </a:lvl1pPr>
+          </a:lstStyle>
+          <a:p>
+            <a:fld id="{1CC032FC-BF34-4A98-8128-F94D5495AEDE}" type="slidenum">
+              <a:rPr lang="ko-KR" altLang="en-US" smtClean="0"/>
+              <a:t>‹#›</a:t>
+            </a:fld>
+            <a:endParaRPr lang="ko-KR" altLang="en-US"/>
+          </a:p>
+        </p:txBody>
+      </p:sp>
+    </p:spTree>
+    <p:extLst>
+      <p:ext uri="{BB962C8B-B14F-4D97-AF65-F5344CB8AC3E}">
+        <p14:creationId xmlns:p14="http://schemas.microsoft.com/office/powerpoint/2010/main" val="3168875220"/>
+      </p:ext>
+    </p:extLst>
+  </p:cSld>
+  <p:clrMap bg1="lt1" tx1="dk1" bg2="lt2" tx2="dk2" accent1="accent1" accent2="accent2" accent3="accent3" accent4="accent4" accent5="accent5" accent6="accent6" hlink="hlink" folHlink="folHlink"/>
+  <p:notesStyle>
+    <a:lvl1pPr marL="0" algn="l" defTabSz="914400" rtl="0" eaLnBrk="1" latinLnBrk="1" hangingPunct="1">
+      <a:defRPr sz="1200" kern="1200">
+        <a:solidFill>
+          <a:schemeClr val="tx1"/>
+        </a:solidFill>
+        <a:latin typeface="+mn-lt"/>
+        <a:ea typeface="+mn-ea"/>
+        <a:cs typeface="+mn-cs"/>
+      </a:defRPr>
+    </a:lvl1pPr>
+    <a:lvl2pPr marL="457200" algn="l" defTabSz="914400" rtl="0" eaLnBrk="1" latinLnBrk="1" hangingPunct="1">
+      <a:defRPr sz="1200" kern="1200">
+        <a:solidFill>
+          <a:schemeClr val="tx1"/>
+        </a:solidFill>
+        <a:latin typeface="+mn-lt"/>
+        <a:ea typeface="+mn-ea"/>
+        <a:cs typeface="+mn-cs"/>
+      </a:defRPr>
+    </a:lvl2pPr>
+    <a:lvl3pPr marL="914400" algn="l" defTabSz="914400" rtl="0" eaLnBrk="1" latinLnBrk="1" hangingPunct="1">
+      <a:defRPr sz="1200" kern="1200">
+        <a:solidFill>
+          <a:schemeClr val="tx1"/>
+        </a:solidFill>
+        <a:latin typeface="+mn-lt"/>
+        <a:ea typeface="+mn-ea"/>
+        <a:cs typeface="+mn-cs"/>
+      </a:defRPr>
+    </a:lvl3pPr>
+    <a:lvl4pPr marL="1371600" algn="l" defTabSz="914400" rtl="0" eaLnBrk="1" latinLnBrk="1" hangingPunct="1">
+      <a:defRPr sz="1200" kern="1200">
+        <a:solidFill>
+          <a:schemeClr val="tx1"/>
+        </a:solidFill>
+        <a:latin typeface="+mn-lt"/>
+        <a:ea typeface="+mn-ea"/>
+        <a:cs typeface="+mn-cs"/>
+      </a:defRPr>
+    </a:lvl4pPr>
+    <a:lvl5pPr marL="1828800" algn="l" defTabSz="914400" rtl="0" eaLnBrk="1" latinLnBrk="1" hangingPunct="1">
+      <a:defRPr sz="1200" kern="1200">
+        <a:solidFill>
+          <a:schemeClr val="tx1"/>
+        </a:solidFill>
+        <a:latin typeface="+mn-lt"/>
+        <a:ea typeface="+mn-ea"/>
+        <a:cs typeface="+mn-cs"/>
+      </a:defRPr>
+    </a:lvl5pPr>
+    <a:lvl6pPr marL="2286000" algn="l" defTabSz="914400" rtl="0" eaLnBrk="1" latinLnBrk="1" hangingPunct="1">
+      <a:defRPr sz="1200" kern="1200">
+        <a:solidFill>
+          <a:schemeClr val="tx1"/>
+        </a:solidFill>
+        <a:latin typeface="+mn-lt"/>
+        <a:ea typeface="+mn-ea"/>
+        <a:cs typeface="+mn-cs"/>
+      </a:defRPr>
+    </a:lvl6pPr>
+    <a:lvl7pPr marL="2743200" algn="l" defTabSz="914400" rtl="0" eaLnBrk="1" latinLnBrk="1" hangingPunct="1">
+      <a:defRPr sz="1200" kern="1200">
+        <a:solidFill>
+          <a:schemeClr val="tx1"/>
+        </a:solidFill>
+        <a:latin typeface="+mn-lt"/>
+        <a:ea typeface="+mn-ea"/>
+        <a:cs typeface="+mn-cs"/>
+      </a:defRPr>
+    </a:lvl7pPr>
+    <a:lvl8pPr marL="3200400" algn="l" defTabSz="914400" rtl="0" eaLnBrk="1" latinLnBrk="1" hangingPunct="1">
+      <a:defRPr sz="1200" kern="1200">
+        <a:solidFill>
+          <a:schemeClr val="tx1"/>
+        </a:solidFill>
+        <a:latin typeface="+mn-lt"/>
+        <a:ea typeface="+mn-ea"/>
+        <a:cs typeface="+mn-cs"/>
+      </a:defRPr>
+    </a:lvl8pPr>
+    <a:lvl9pPr marL="3657600" algn="l" defTabSz="914400" rtl="0" eaLnBrk="1" latinLnBrk="1" hangingPunct="1">
+      <a:defRPr sz="1200" kern="1200">
+        <a:solidFill>
+          <a:schemeClr val="tx1"/>
+        </a:solidFill>
+        <a:latin typeface="+mn-lt"/>
+        <a:ea typeface="+mn-ea"/>
+        <a:cs typeface="+mn-cs"/>
+      </a:defRPr>
+    </a:lvl9pPr>
+  </p:notesStyle>
+</p:notesMaster>
+</file>
+
+<file path=ppt/notesSlides/notesSlide1.xml><?xml version="1.0" encoding="utf-8"?>
+<p:notes xmlns:a="http://schemas.openxmlformats.org/drawingml/2006/main" xmlns:r="http://schemas.openxmlformats.org/officeDocument/2006/relationships" xmlns:p="http://schemas.openxmlformats.org/presentationml/2006/main">
+  <p:cSld>
+    <p:spTree>
+      <p:nvGrpSpPr>
+        <p:cNvPr id="1" name=""/>
+        <p:cNvGrpSpPr/>
+        <p:nvPr/>
+      </p:nvGrpSpPr>
+      <p:grpSpPr>
+        <a:xfrm>
+          <a:off x="0" y="0"/>
+          <a:ext cx="0" cy="0"/>
+          <a:chOff x="0" y="0"/>
+          <a:chExt cx="0" cy="0"/>
+        </a:xfrm>
+      </p:grpSpPr>
+      <p:sp>
+        <p:nvSpPr>
+          <p:cNvPr id="2" name="슬라이드 이미지 개체 틀 1"/>
+          <p:cNvSpPr>
+            <a:spLocks noGrp="1" noRot="1" noChangeAspect="1"/>
+          </p:cNvSpPr>
+          <p:nvPr>
+            <p:ph type="sldImg"/>
+          </p:nvPr>
+        </p:nvSpPr>
+        <p:spPr>
+          <a:xfrm>
+            <a:off x="2360613" y="1143000"/>
+            <a:ext cx="2136775" cy="3086100"/>
+          </a:xfrm>
+        </p:spPr>
+      </p:sp>
+      <p:sp>
+        <p:nvSpPr>
+          <p:cNvPr id="3" name="슬라이드 노트 개체 틀 2"/>
+          <p:cNvSpPr>
+            <a:spLocks noGrp="1"/>
+          </p:cNvSpPr>
+          <p:nvPr>
+            <p:ph type="body" idx="1"/>
+          </p:nvPr>
+        </p:nvSpPr>
+        <p:spPr/>
+        <p:txBody>
+          <a:bodyPr/>
+          <a:lstStyle/>
+          <a:p>
+            <a:endParaRPr lang="ko-KR" altLang="en-US"/>
+          </a:p>
+        </p:txBody>
+      </p:sp>
+      <p:sp>
+        <p:nvSpPr>
+          <p:cNvPr id="4" name="슬라이드 번호 개체 틀 3"/>
+          <p:cNvSpPr>
+            <a:spLocks noGrp="1"/>
+          </p:cNvSpPr>
+          <p:nvPr>
+            <p:ph type="sldNum" sz="quarter" idx="5"/>
+          </p:nvPr>
+        </p:nvSpPr>
+        <p:spPr/>
+        <p:txBody>
+          <a:bodyPr/>
+          <a:lstStyle/>
+          <a:p>
+            <a:fld id="{681C46EC-84D8-4725-8DC8-393D03B59648}" type="slidenum">
+              <a:rPr lang="ko-KR" altLang="en-US" smtClean="0"/>
+              <a:t>6</a:t>
+            </a:fld>
+            <a:endParaRPr lang="ko-KR" altLang="en-US"/>
+          </a:p>
+        </p:txBody>
+      </p:sp>
+    </p:spTree>
+    <p:extLst>
+      <p:ext uri="{BB962C8B-B14F-4D97-AF65-F5344CB8AC3E}">
+        <p14:creationId xmlns:p14="http://schemas.microsoft.com/office/powerpoint/2010/main" val="1829694921"/>
+      </p:ext>
+    </p:extLst>
+  </p:cSld>
+  <p:clrMapOvr>
+    <a:masterClrMapping/>
+  </p:clrMapOvr>
+</p:notes>
+</file>
+
 <file path=ppt/slideLayouts/slideLayout1.xml><?xml version="1.0" encoding="utf-8"?>
 <p:sldLayout xmlns:a="http://schemas.openxmlformats.org/drawingml/2006/main" xmlns:r="http://schemas.openxmlformats.org/officeDocument/2006/relationships" xmlns:p="http://schemas.openxmlformats.org/presentationml/2006/main" type="title" preserve="1">
   <p:cSld name="제목 슬라이드">
@@ -262,7 +705,7 @@
           <a:p>
             <a:fld id="{5389EBCC-073C-4A55-A030-C8BA30EC2787}" type="datetimeFigureOut">
               <a:rPr lang="ko-KR" altLang="en-US" smtClean="0"/>
-              <a:t>2020-01-04</a:t>
+              <a:t>2020-01-16</a:t>
             </a:fld>
             <a:endParaRPr lang="ko-KR" altLang="en-US"/>
           </a:p>
@@ -460,7 +903,7 @@
           <a:p>
             <a:fld id="{5389EBCC-073C-4A55-A030-C8BA30EC2787}" type="datetimeFigureOut">
               <a:rPr lang="ko-KR" altLang="en-US" smtClean="0"/>
-              <a:t>2020-01-04</a:t>
+              <a:t>2020-01-16</a:t>
             </a:fld>
             <a:endParaRPr lang="ko-KR" altLang="en-US"/>
           </a:p>
@@ -668,7 +1111,7 @@
           <a:p>
             <a:fld id="{5389EBCC-073C-4A55-A030-C8BA30EC2787}" type="datetimeFigureOut">
               <a:rPr lang="ko-KR" altLang="en-US" smtClean="0"/>
-              <a:t>2020-01-04</a:t>
+              <a:t>2020-01-16</a:t>
             </a:fld>
             <a:endParaRPr lang="ko-KR" altLang="en-US"/>
           </a:p>
@@ -866,7 +1309,7 @@
           <a:p>
             <a:fld id="{5389EBCC-073C-4A55-A030-C8BA30EC2787}" type="datetimeFigureOut">
               <a:rPr lang="ko-KR" altLang="en-US" smtClean="0"/>
-              <a:t>2020-01-04</a:t>
+              <a:t>2020-01-16</a:t>
             </a:fld>
             <a:endParaRPr lang="ko-KR" altLang="en-US"/>
           </a:p>
@@ -1141,7 +1584,7 @@
           <a:p>
             <a:fld id="{5389EBCC-073C-4A55-A030-C8BA30EC2787}" type="datetimeFigureOut">
               <a:rPr lang="ko-KR" altLang="en-US" smtClean="0"/>
-              <a:t>2020-01-04</a:t>
+              <a:t>2020-01-16</a:t>
             </a:fld>
             <a:endParaRPr lang="ko-KR" altLang="en-US"/>
           </a:p>
@@ -1406,7 +1849,7 @@
           <a:p>
             <a:fld id="{5389EBCC-073C-4A55-A030-C8BA30EC2787}" type="datetimeFigureOut">
               <a:rPr lang="ko-KR" altLang="en-US" smtClean="0"/>
-              <a:t>2020-01-04</a:t>
+              <a:t>2020-01-16</a:t>
             </a:fld>
             <a:endParaRPr lang="ko-KR" altLang="en-US"/>
           </a:p>
@@ -1818,7 +2261,7 @@
           <a:p>
             <a:fld id="{5389EBCC-073C-4A55-A030-C8BA30EC2787}" type="datetimeFigureOut">
               <a:rPr lang="ko-KR" altLang="en-US" smtClean="0"/>
-              <a:t>2020-01-04</a:t>
+              <a:t>2020-01-16</a:t>
             </a:fld>
             <a:endParaRPr lang="ko-KR" altLang="en-US"/>
           </a:p>
@@ -1959,7 +2402,7 @@
           <a:p>
             <a:fld id="{5389EBCC-073C-4A55-A030-C8BA30EC2787}" type="datetimeFigureOut">
               <a:rPr lang="ko-KR" altLang="en-US" smtClean="0"/>
-              <a:t>2020-01-04</a:t>
+              <a:t>2020-01-16</a:t>
             </a:fld>
             <a:endParaRPr lang="ko-KR" altLang="en-US"/>
           </a:p>
@@ -2072,7 +2515,7 @@
           <a:p>
             <a:fld id="{5389EBCC-073C-4A55-A030-C8BA30EC2787}" type="datetimeFigureOut">
               <a:rPr lang="ko-KR" altLang="en-US" smtClean="0"/>
-              <a:t>2020-01-04</a:t>
+              <a:t>2020-01-16</a:t>
             </a:fld>
             <a:endParaRPr lang="ko-KR" altLang="en-US"/>
           </a:p>
@@ -2383,7 +2826,7 @@
           <a:p>
             <a:fld id="{5389EBCC-073C-4A55-A030-C8BA30EC2787}" type="datetimeFigureOut">
               <a:rPr lang="ko-KR" altLang="en-US" smtClean="0"/>
-              <a:t>2020-01-04</a:t>
+              <a:t>2020-01-16</a:t>
             </a:fld>
             <a:endParaRPr lang="ko-KR" altLang="en-US"/>
           </a:p>
@@ -2671,7 +3114,7 @@
           <a:p>
             <a:fld id="{5389EBCC-073C-4A55-A030-C8BA30EC2787}" type="datetimeFigureOut">
               <a:rPr lang="ko-KR" altLang="en-US" smtClean="0"/>
-              <a:t>2020-01-04</a:t>
+              <a:t>2020-01-16</a:t>
             </a:fld>
             <a:endParaRPr lang="ko-KR" altLang="en-US"/>
           </a:p>
@@ -2912,7 +3355,7 @@
           <a:p>
             <a:fld id="{5389EBCC-073C-4A55-A030-C8BA30EC2787}" type="datetimeFigureOut">
               <a:rPr lang="ko-KR" altLang="en-US" smtClean="0"/>
-              <a:t>2020-01-04</a:t>
+              <a:t>2020-01-16</a:t>
             </a:fld>
             <a:endParaRPr lang="ko-KR" altLang="en-US"/>
           </a:p>
@@ -7432,6 +7875,2017 @@
 </p:sld>
 </file>
 
+<file path=ppt/slides/slide5.xml><?xml version="1.0" encoding="utf-8"?>
+<p:sld xmlns:a="http://schemas.openxmlformats.org/drawingml/2006/main" xmlns:r="http://schemas.openxmlformats.org/officeDocument/2006/relationships" xmlns:p="http://schemas.openxmlformats.org/presentationml/2006/main">
+  <p:cSld>
+    <p:spTree>
+      <p:nvGrpSpPr>
+        <p:cNvPr id="1" name=""/>
+        <p:cNvGrpSpPr/>
+        <p:nvPr/>
+      </p:nvGrpSpPr>
+      <p:grpSpPr>
+        <a:xfrm>
+          <a:off x="0" y="0"/>
+          <a:ext cx="0" cy="0"/>
+          <a:chOff x="0" y="0"/>
+          <a:chExt cx="0" cy="0"/>
+        </a:xfrm>
+      </p:grpSpPr>
+    </p:spTree>
+    <p:extLst>
+      <p:ext uri="{BB962C8B-B14F-4D97-AF65-F5344CB8AC3E}">
+        <p14:creationId xmlns:p14="http://schemas.microsoft.com/office/powerpoint/2010/main" val="2916036331"/>
+      </p:ext>
+    </p:extLst>
+  </p:cSld>
+  <p:clrMapOvr>
+    <a:masterClrMapping/>
+  </p:clrMapOvr>
+</p:sld>
+</file>
+
+<file path=ppt/slides/slide6.xml><?xml version="1.0" encoding="utf-8"?>
+<p:sld xmlns:a="http://schemas.openxmlformats.org/drawingml/2006/main" xmlns:r="http://schemas.openxmlformats.org/officeDocument/2006/relationships" xmlns:p="http://schemas.openxmlformats.org/presentationml/2006/main">
+  <p:cSld>
+    <p:spTree>
+      <p:nvGrpSpPr>
+        <p:cNvPr id="1" name=""/>
+        <p:cNvGrpSpPr/>
+        <p:nvPr/>
+      </p:nvGrpSpPr>
+      <p:grpSpPr>
+        <a:xfrm>
+          <a:off x="0" y="0"/>
+          <a:ext cx="0" cy="0"/>
+          <a:chOff x="0" y="0"/>
+          <a:chExt cx="0" cy="0"/>
+        </a:xfrm>
+      </p:grpSpPr>
+      <p:sp>
+        <p:nvSpPr>
+          <p:cNvPr id="8" name="직사각형 7">
+            <a:extLst>
+              <a:ext uri="{FF2B5EF4-FFF2-40B4-BE49-F238E27FC236}">
+                <a16:creationId xmlns:a16="http://schemas.microsoft.com/office/drawing/2014/main" id="{4D599CFD-471A-4F6F-9F3A-F9A7B4ED39F4}"/>
+              </a:ext>
+            </a:extLst>
+          </p:cNvPr>
+          <p:cNvSpPr/>
+          <p:nvPr/>
+        </p:nvSpPr>
+        <p:spPr>
+          <a:xfrm>
+            <a:off x="3722077" y="1"/>
+            <a:ext cx="4747846" cy="6857999"/>
+          </a:xfrm>
+          <a:prstGeom prst="rect">
+            <a:avLst/>
+          </a:prstGeom>
+          <a:solidFill>
+            <a:schemeClr val="bg1">
+              <a:lumMod val="95000"/>
+            </a:schemeClr>
+          </a:solidFill>
+          <a:ln>
+            <a:noFill/>
+          </a:ln>
+        </p:spPr>
+        <p:style>
+          <a:lnRef idx="2">
+            <a:schemeClr val="accent1">
+              <a:shade val="50000"/>
+            </a:schemeClr>
+          </a:lnRef>
+          <a:fillRef idx="1">
+            <a:schemeClr val="accent1"/>
+          </a:fillRef>
+          <a:effectRef idx="0">
+            <a:schemeClr val="accent1"/>
+          </a:effectRef>
+          <a:fontRef idx="minor">
+            <a:schemeClr val="lt1"/>
+          </a:fontRef>
+        </p:style>
+        <p:txBody>
+          <a:bodyPr rot="0" spcFirstLastPara="0" vertOverflow="overflow" horzOverflow="overflow" vert="horz" wrap="square" lIns="63305" tIns="31652" rIns="63305" bIns="31652" numCol="1" spcCol="0" rtlCol="0" fromWordArt="0" anchor="ctr" anchorCtr="0" forceAA="0" compatLnSpc="1">
+            <a:prstTxWarp prst="textNoShape">
+              <a:avLst/>
+            </a:prstTxWarp>
+            <a:noAutofit/>
+          </a:bodyPr>
+          <a:lstStyle/>
+          <a:p>
+            <a:pPr algn="ctr"/>
+            <a:endParaRPr lang="ko-KR" altLang="en-US" sz="1246" dirty="0"/>
+          </a:p>
+        </p:txBody>
+      </p:sp>
+      <p:grpSp>
+        <p:nvGrpSpPr>
+          <p:cNvPr id="18" name="그룹 17">
+            <a:extLst>
+              <a:ext uri="{FF2B5EF4-FFF2-40B4-BE49-F238E27FC236}">
+                <a16:creationId xmlns:a16="http://schemas.microsoft.com/office/drawing/2014/main" id="{98CA4228-FB0A-4C7D-9160-282B7EA32ED5}"/>
+              </a:ext>
+            </a:extLst>
+          </p:cNvPr>
+          <p:cNvGrpSpPr/>
+          <p:nvPr/>
+        </p:nvGrpSpPr>
+        <p:grpSpPr>
+          <a:xfrm>
+            <a:off x="3834433" y="911118"/>
+            <a:ext cx="1760485" cy="236073"/>
+            <a:chOff x="352677" y="1325880"/>
+            <a:chExt cx="1934779" cy="340995"/>
+          </a:xfrm>
+          <a:effectLst>
+            <a:outerShdw blurRad="50800" dist="38100" dir="2700000" algn="tl" rotWithShape="0">
+              <a:prstClr val="black">
+                <a:alpha val="40000"/>
+              </a:prstClr>
+            </a:outerShdw>
+          </a:effectLst>
+        </p:grpSpPr>
+        <p:sp>
+          <p:nvSpPr>
+            <p:cNvPr id="19" name="화살표: 갈매기형 수장 18">
+              <a:extLst>
+                <a:ext uri="{FF2B5EF4-FFF2-40B4-BE49-F238E27FC236}">
+                  <a16:creationId xmlns:a16="http://schemas.microsoft.com/office/drawing/2014/main" id="{9D5085FD-7D3E-4D0E-9BB8-2360C4EFE81F}"/>
+                </a:ext>
+              </a:extLst>
+            </p:cNvPr>
+            <p:cNvSpPr/>
+            <p:nvPr/>
+          </p:nvSpPr>
+          <p:spPr>
+            <a:xfrm flipH="1">
+              <a:off x="1997896" y="1325880"/>
+              <a:ext cx="289560" cy="340995"/>
+            </a:xfrm>
+            <a:prstGeom prst="chevron">
+              <a:avLst/>
+            </a:prstGeom>
+            <a:solidFill>
+              <a:srgbClr val="CC3399"/>
+            </a:solidFill>
+            <a:ln>
+              <a:noFill/>
+            </a:ln>
+          </p:spPr>
+          <p:style>
+            <a:lnRef idx="2">
+              <a:schemeClr val="accent1">
+                <a:shade val="50000"/>
+              </a:schemeClr>
+            </a:lnRef>
+            <a:fillRef idx="1">
+              <a:schemeClr val="accent1"/>
+            </a:fillRef>
+            <a:effectRef idx="0">
+              <a:schemeClr val="accent1"/>
+            </a:effectRef>
+            <a:fontRef idx="minor">
+              <a:schemeClr val="lt1"/>
+            </a:fontRef>
+          </p:style>
+          <p:txBody>
+            <a:bodyPr rot="0" spcFirstLastPara="0" vertOverflow="overflow" horzOverflow="overflow" vert="horz" wrap="square" lIns="63305" tIns="31652" rIns="63305" bIns="31652" numCol="1" spcCol="0" rtlCol="0" fromWordArt="0" anchor="ctr" anchorCtr="0" forceAA="0" compatLnSpc="1">
+              <a:prstTxWarp prst="textNoShape">
+                <a:avLst/>
+              </a:prstTxWarp>
+              <a:noAutofit/>
+            </a:bodyPr>
+            <a:lstStyle/>
+            <a:p>
+              <a:pPr algn="ctr"/>
+              <a:endParaRPr lang="ko-KR" altLang="en-US" sz="1246">
+                <a:solidFill>
+                  <a:schemeClr val="tx1"/>
+                </a:solidFill>
+              </a:endParaRPr>
+            </a:p>
+          </p:txBody>
+        </p:sp>
+        <p:sp>
+          <p:nvSpPr>
+            <p:cNvPr id="20" name="직사각형 19">
+              <a:extLst>
+                <a:ext uri="{FF2B5EF4-FFF2-40B4-BE49-F238E27FC236}">
+                  <a16:creationId xmlns:a16="http://schemas.microsoft.com/office/drawing/2014/main" id="{E909DD5F-5E81-4EDB-859A-8A79024BB74B}"/>
+                </a:ext>
+              </a:extLst>
+            </p:cNvPr>
+            <p:cNvSpPr/>
+            <p:nvPr/>
+          </p:nvSpPr>
+          <p:spPr>
+            <a:xfrm>
+              <a:off x="352677" y="1325880"/>
+              <a:ext cx="1790000" cy="340995"/>
+            </a:xfrm>
+            <a:prstGeom prst="rect">
+              <a:avLst/>
+            </a:prstGeom>
+            <a:solidFill>
+              <a:srgbClr val="CC3399"/>
+            </a:solidFill>
+            <a:ln>
+              <a:noFill/>
+            </a:ln>
+          </p:spPr>
+          <p:style>
+            <a:lnRef idx="2">
+              <a:schemeClr val="accent1">
+                <a:shade val="50000"/>
+              </a:schemeClr>
+            </a:lnRef>
+            <a:fillRef idx="1">
+              <a:schemeClr val="accent1"/>
+            </a:fillRef>
+            <a:effectRef idx="0">
+              <a:schemeClr val="accent1"/>
+            </a:effectRef>
+            <a:fontRef idx="minor">
+              <a:schemeClr val="lt1"/>
+            </a:fontRef>
+          </p:style>
+          <p:txBody>
+            <a:bodyPr rot="0" spcFirstLastPara="0" vertOverflow="overflow" horzOverflow="overflow" vert="horz" wrap="square" lIns="63305" tIns="31652" rIns="63305" bIns="31652" numCol="1" spcCol="0" rtlCol="0" fromWordArt="0" anchor="ctr" anchorCtr="0" forceAA="0" compatLnSpc="1">
+              <a:prstTxWarp prst="textNoShape">
+                <a:avLst/>
+              </a:prstTxWarp>
+              <a:noAutofit/>
+            </a:bodyPr>
+            <a:lstStyle/>
+            <a:p>
+              <a:pPr algn="ctr"/>
+              <a:endParaRPr lang="ko-KR" altLang="en-US" sz="1246"/>
+            </a:p>
+          </p:txBody>
+        </p:sp>
+      </p:grpSp>
+      <p:sp>
+        <p:nvSpPr>
+          <p:cNvPr id="13" name="TextBox 12">
+            <a:extLst>
+              <a:ext uri="{FF2B5EF4-FFF2-40B4-BE49-F238E27FC236}">
+                <a16:creationId xmlns:a16="http://schemas.microsoft.com/office/drawing/2014/main" id="{940FE01C-2F5F-4526-8613-D9ED704BB813}"/>
+              </a:ext>
+            </a:extLst>
+          </p:cNvPr>
+          <p:cNvSpPr txBox="1"/>
+          <p:nvPr/>
+        </p:nvSpPr>
+        <p:spPr>
+          <a:xfrm>
+            <a:off x="3773442" y="1220117"/>
+            <a:ext cx="3379476" cy="213076"/>
+          </a:xfrm>
+          <a:prstGeom prst="rect">
+            <a:avLst/>
+          </a:prstGeom>
+          <a:noFill/>
+        </p:spPr>
+        <p:txBody>
+          <a:bodyPr wrap="none" rtlCol="0">
+            <a:noAutofit/>
+          </a:bodyPr>
+          <a:lstStyle/>
+          <a:p>
+            <a:r>
+              <a:rPr lang="ko-KR" altLang="en-US" sz="969" spc="-104" dirty="0">
+                <a:latin typeface="HY견고딕" panose="02030600000101010101" pitchFamily="18" charset="-127"/>
+                <a:ea typeface="HY견고딕" panose="02030600000101010101" pitchFamily="18" charset="-127"/>
+              </a:rPr>
+              <a:t>세안은 시술 다음 날부터 조심스럽게 딱지가 안 떨어지게 해주세요</a:t>
+            </a:r>
+            <a:r>
+              <a:rPr lang="en-US" altLang="ko-KR" sz="969" spc="-104" dirty="0">
+                <a:latin typeface="HY견고딕" panose="02030600000101010101" pitchFamily="18" charset="-127"/>
+                <a:ea typeface="HY견고딕" panose="02030600000101010101" pitchFamily="18" charset="-127"/>
+              </a:rPr>
+              <a:t>.</a:t>
+            </a:r>
+            <a:endParaRPr lang="ko-KR" altLang="en-US" sz="969" spc="-104" dirty="0">
+              <a:latin typeface="HY견고딕" panose="02030600000101010101" pitchFamily="18" charset="-127"/>
+              <a:ea typeface="HY견고딕" panose="02030600000101010101" pitchFamily="18" charset="-127"/>
+            </a:endParaRPr>
+          </a:p>
+        </p:txBody>
+      </p:sp>
+      <p:sp>
+        <p:nvSpPr>
+          <p:cNvPr id="12" name="TextBox 11">
+            <a:extLst>
+              <a:ext uri="{FF2B5EF4-FFF2-40B4-BE49-F238E27FC236}">
+                <a16:creationId xmlns:a16="http://schemas.microsoft.com/office/drawing/2014/main" id="{591393CB-D6EE-40A4-9E84-18B1C0981BDB}"/>
+              </a:ext>
+            </a:extLst>
+          </p:cNvPr>
+          <p:cNvSpPr txBox="1"/>
+          <p:nvPr/>
+        </p:nvSpPr>
+        <p:spPr>
+          <a:xfrm>
+            <a:off x="3808634" y="908281"/>
+            <a:ext cx="1154384" cy="262829"/>
+          </a:xfrm>
+          <a:prstGeom prst="rect">
+            <a:avLst/>
+          </a:prstGeom>
+          <a:noFill/>
+        </p:spPr>
+        <p:txBody>
+          <a:bodyPr wrap="square" rtlCol="0">
+            <a:spAutoFit/>
+          </a:bodyPr>
+          <a:lstStyle/>
+          <a:p>
+            <a:pPr algn="ctr"/>
+            <a:r>
+              <a:rPr lang="ko-KR" altLang="en-US" sz="1108" b="1" spc="-104" dirty="0">
+                <a:solidFill>
+                  <a:schemeClr val="bg1"/>
+                </a:solidFill>
+                <a:latin typeface="HY엽서M" panose="02030600000101010101" pitchFamily="18" charset="-127"/>
+                <a:ea typeface="HY엽서M" panose="02030600000101010101" pitchFamily="18" charset="-127"/>
+              </a:rPr>
+              <a:t>세안시 주의사항</a:t>
+            </a:r>
+          </a:p>
+        </p:txBody>
+      </p:sp>
+      <p:grpSp>
+        <p:nvGrpSpPr>
+          <p:cNvPr id="21" name="그룹 20">
+            <a:extLst>
+              <a:ext uri="{FF2B5EF4-FFF2-40B4-BE49-F238E27FC236}">
+                <a16:creationId xmlns:a16="http://schemas.microsoft.com/office/drawing/2014/main" id="{ABC89A5F-CD76-459C-B298-7EA966C4A000}"/>
+              </a:ext>
+            </a:extLst>
+          </p:cNvPr>
+          <p:cNvGrpSpPr/>
+          <p:nvPr/>
+        </p:nvGrpSpPr>
+        <p:grpSpPr>
+          <a:xfrm>
+            <a:off x="3834433" y="1602577"/>
+            <a:ext cx="1760485" cy="236073"/>
+            <a:chOff x="352677" y="1325880"/>
+            <a:chExt cx="1934779" cy="340995"/>
+          </a:xfrm>
+          <a:effectLst>
+            <a:outerShdw blurRad="50800" dist="38100" dir="2700000" algn="tl" rotWithShape="0">
+              <a:prstClr val="black">
+                <a:alpha val="40000"/>
+              </a:prstClr>
+            </a:outerShdw>
+          </a:effectLst>
+        </p:grpSpPr>
+        <p:sp>
+          <p:nvSpPr>
+            <p:cNvPr id="22" name="화살표: 갈매기형 수장 21">
+              <a:extLst>
+                <a:ext uri="{FF2B5EF4-FFF2-40B4-BE49-F238E27FC236}">
+                  <a16:creationId xmlns:a16="http://schemas.microsoft.com/office/drawing/2014/main" id="{FF1739DB-B5FF-4A95-A3E1-6A6CE3C9FAEC}"/>
+                </a:ext>
+              </a:extLst>
+            </p:cNvPr>
+            <p:cNvSpPr/>
+            <p:nvPr/>
+          </p:nvSpPr>
+          <p:spPr>
+            <a:xfrm flipH="1">
+              <a:off x="1997896" y="1325880"/>
+              <a:ext cx="289560" cy="340995"/>
+            </a:xfrm>
+            <a:prstGeom prst="chevron">
+              <a:avLst/>
+            </a:prstGeom>
+            <a:solidFill>
+              <a:srgbClr val="CC3399"/>
+            </a:solidFill>
+            <a:ln>
+              <a:noFill/>
+            </a:ln>
+          </p:spPr>
+          <p:style>
+            <a:lnRef idx="2">
+              <a:schemeClr val="accent1">
+                <a:shade val="50000"/>
+              </a:schemeClr>
+            </a:lnRef>
+            <a:fillRef idx="1">
+              <a:schemeClr val="accent1"/>
+            </a:fillRef>
+            <a:effectRef idx="0">
+              <a:schemeClr val="accent1"/>
+            </a:effectRef>
+            <a:fontRef idx="minor">
+              <a:schemeClr val="lt1"/>
+            </a:fontRef>
+          </p:style>
+          <p:txBody>
+            <a:bodyPr rot="0" spcFirstLastPara="0" vertOverflow="overflow" horzOverflow="overflow" vert="horz" wrap="square" lIns="63305" tIns="31652" rIns="63305" bIns="31652" numCol="1" spcCol="0" rtlCol="0" fromWordArt="0" anchor="ctr" anchorCtr="0" forceAA="0" compatLnSpc="1">
+              <a:prstTxWarp prst="textNoShape">
+                <a:avLst/>
+              </a:prstTxWarp>
+              <a:noAutofit/>
+            </a:bodyPr>
+            <a:lstStyle/>
+            <a:p>
+              <a:pPr algn="ctr"/>
+              <a:endParaRPr lang="ko-KR" altLang="en-US" sz="1246">
+                <a:solidFill>
+                  <a:schemeClr val="tx1"/>
+                </a:solidFill>
+              </a:endParaRPr>
+            </a:p>
+          </p:txBody>
+        </p:sp>
+        <p:sp>
+          <p:nvSpPr>
+            <p:cNvPr id="23" name="직사각형 22">
+              <a:extLst>
+                <a:ext uri="{FF2B5EF4-FFF2-40B4-BE49-F238E27FC236}">
+                  <a16:creationId xmlns:a16="http://schemas.microsoft.com/office/drawing/2014/main" id="{74357CAD-C3F9-4031-A55C-DA4AA18104AE}"/>
+                </a:ext>
+              </a:extLst>
+            </p:cNvPr>
+            <p:cNvSpPr/>
+            <p:nvPr/>
+          </p:nvSpPr>
+          <p:spPr>
+            <a:xfrm>
+              <a:off x="352677" y="1325880"/>
+              <a:ext cx="1790000" cy="340995"/>
+            </a:xfrm>
+            <a:prstGeom prst="rect">
+              <a:avLst/>
+            </a:prstGeom>
+            <a:solidFill>
+              <a:srgbClr val="CC3399"/>
+            </a:solidFill>
+            <a:ln>
+              <a:noFill/>
+            </a:ln>
+          </p:spPr>
+          <p:style>
+            <a:lnRef idx="2">
+              <a:schemeClr val="accent1">
+                <a:shade val="50000"/>
+              </a:schemeClr>
+            </a:lnRef>
+            <a:fillRef idx="1">
+              <a:schemeClr val="accent1"/>
+            </a:fillRef>
+            <a:effectRef idx="0">
+              <a:schemeClr val="accent1"/>
+            </a:effectRef>
+            <a:fontRef idx="minor">
+              <a:schemeClr val="lt1"/>
+            </a:fontRef>
+          </p:style>
+          <p:txBody>
+            <a:bodyPr rot="0" spcFirstLastPara="0" vertOverflow="overflow" horzOverflow="overflow" vert="horz" wrap="square" lIns="63305" tIns="31652" rIns="63305" bIns="31652" numCol="1" spcCol="0" rtlCol="0" fromWordArt="0" anchor="ctr" anchorCtr="0" forceAA="0" compatLnSpc="1">
+              <a:prstTxWarp prst="textNoShape">
+                <a:avLst/>
+              </a:prstTxWarp>
+              <a:noAutofit/>
+            </a:bodyPr>
+            <a:lstStyle/>
+            <a:p>
+              <a:pPr algn="ctr"/>
+              <a:endParaRPr lang="ko-KR" altLang="en-US" sz="1246"/>
+            </a:p>
+          </p:txBody>
+        </p:sp>
+      </p:grpSp>
+      <p:sp>
+        <p:nvSpPr>
+          <p:cNvPr id="24" name="TextBox 23">
+            <a:extLst>
+              <a:ext uri="{FF2B5EF4-FFF2-40B4-BE49-F238E27FC236}">
+                <a16:creationId xmlns:a16="http://schemas.microsoft.com/office/drawing/2014/main" id="{3EE81D06-5141-4BA0-BEA3-08C971416109}"/>
+              </a:ext>
+            </a:extLst>
+          </p:cNvPr>
+          <p:cNvSpPr txBox="1"/>
+          <p:nvPr/>
+        </p:nvSpPr>
+        <p:spPr>
+          <a:xfrm>
+            <a:off x="3762846" y="1592113"/>
+            <a:ext cx="1582961" cy="262829"/>
+          </a:xfrm>
+          <a:prstGeom prst="rect">
+            <a:avLst/>
+          </a:prstGeom>
+          <a:noFill/>
+        </p:spPr>
+        <p:txBody>
+          <a:bodyPr wrap="square" rtlCol="0">
+            <a:spAutoFit/>
+          </a:bodyPr>
+          <a:lstStyle/>
+          <a:p>
+            <a:pPr algn="ctr"/>
+            <a:r>
+              <a:rPr lang="ko-KR" altLang="en-US" sz="1108" b="1" spc="-104" dirty="0">
+                <a:solidFill>
+                  <a:schemeClr val="bg1"/>
+                </a:solidFill>
+                <a:latin typeface="HY엽서M" panose="02030600000101010101" pitchFamily="18" charset="-127"/>
+                <a:ea typeface="HY엽서M" panose="02030600000101010101" pitchFamily="18" charset="-127"/>
+              </a:rPr>
+              <a:t>선크림은 필수 입니다</a:t>
+            </a:r>
+            <a:r>
+              <a:rPr lang="en-US" altLang="ko-KR" sz="1108" b="1" spc="-104" dirty="0">
+                <a:solidFill>
+                  <a:schemeClr val="bg1"/>
+                </a:solidFill>
+                <a:latin typeface="HY엽서M" panose="02030600000101010101" pitchFamily="18" charset="-127"/>
+                <a:ea typeface="HY엽서M" panose="02030600000101010101" pitchFamily="18" charset="-127"/>
+              </a:rPr>
+              <a:t>.</a:t>
+            </a:r>
+            <a:endParaRPr lang="ko-KR" altLang="en-US" sz="1108" b="1" spc="-104" dirty="0">
+              <a:solidFill>
+                <a:schemeClr val="bg1"/>
+              </a:solidFill>
+              <a:latin typeface="HY엽서M" panose="02030600000101010101" pitchFamily="18" charset="-127"/>
+              <a:ea typeface="HY엽서M" panose="02030600000101010101" pitchFamily="18" charset="-127"/>
+            </a:endParaRPr>
+          </a:p>
+        </p:txBody>
+      </p:sp>
+      <p:sp>
+        <p:nvSpPr>
+          <p:cNvPr id="25" name="TextBox 24">
+            <a:extLst>
+              <a:ext uri="{FF2B5EF4-FFF2-40B4-BE49-F238E27FC236}">
+                <a16:creationId xmlns:a16="http://schemas.microsoft.com/office/drawing/2014/main" id="{BAD9F6CD-E9E1-4B6A-AA29-4B8CB13BFB61}"/>
+              </a:ext>
+            </a:extLst>
+          </p:cNvPr>
+          <p:cNvSpPr txBox="1"/>
+          <p:nvPr/>
+        </p:nvSpPr>
+        <p:spPr>
+          <a:xfrm>
+            <a:off x="3777577" y="1898840"/>
+            <a:ext cx="4636846" cy="660536"/>
+          </a:xfrm>
+          <a:prstGeom prst="rect">
+            <a:avLst/>
+          </a:prstGeom>
+          <a:noFill/>
+        </p:spPr>
+        <p:txBody>
+          <a:bodyPr wrap="none" rtlCol="0">
+            <a:noAutofit/>
+          </a:bodyPr>
+          <a:lstStyle/>
+          <a:p>
+            <a:r>
+              <a:rPr lang="ko-KR" altLang="en-US" sz="969" spc="-104" dirty="0">
+                <a:latin typeface="HY견고딕" panose="02030600000101010101" pitchFamily="18" charset="-127"/>
+                <a:ea typeface="HY견고딕" panose="02030600000101010101" pitchFamily="18" charset="-127"/>
+              </a:rPr>
+              <a:t>피부가 재생되는 한 달 동안은 선크림을 실내나 실외에서 똑같이 </a:t>
+            </a:r>
+            <a:r>
+              <a:rPr lang="en-US" altLang="ko-KR" sz="969" spc="-104" dirty="0">
+                <a:solidFill>
+                  <a:srgbClr val="CC3399"/>
+                </a:solidFill>
+                <a:latin typeface="HY견고딕" panose="02030600000101010101" pitchFamily="18" charset="-127"/>
+                <a:ea typeface="HY견고딕" panose="02030600000101010101" pitchFamily="18" charset="-127"/>
+              </a:rPr>
+              <a:t>3</a:t>
+            </a:r>
+            <a:r>
+              <a:rPr lang="ko-KR" altLang="en-US" sz="969" spc="-104" dirty="0">
+                <a:solidFill>
+                  <a:srgbClr val="CC3399"/>
+                </a:solidFill>
+                <a:latin typeface="HY견고딕" panose="02030600000101010101" pitchFamily="18" charset="-127"/>
+                <a:ea typeface="HY견고딕" panose="02030600000101010101" pitchFamily="18" charset="-127"/>
+              </a:rPr>
+              <a:t>시간 간격</a:t>
+            </a:r>
+            <a:r>
+              <a:rPr lang="ko-KR" altLang="en-US" sz="969" spc="-104" dirty="0">
+                <a:latin typeface="HY견고딕" panose="02030600000101010101" pitchFamily="18" charset="-127"/>
+                <a:ea typeface="HY견고딕" panose="02030600000101010101" pitchFamily="18" charset="-127"/>
+              </a:rPr>
+              <a:t>으로 발라주세요</a:t>
+            </a:r>
+            <a:r>
+              <a:rPr lang="en-US" altLang="ko-KR" sz="969" spc="-104" dirty="0">
+                <a:latin typeface="HY견고딕" panose="02030600000101010101" pitchFamily="18" charset="-127"/>
+                <a:ea typeface="HY견고딕" panose="02030600000101010101" pitchFamily="18" charset="-127"/>
+              </a:rPr>
+              <a:t>.</a:t>
+            </a:r>
+          </a:p>
+          <a:p>
+            <a:r>
+              <a:rPr lang="ko-KR" altLang="en-US" sz="969" spc="-104" dirty="0">
+                <a:latin typeface="HY견고딕" panose="02030600000101010101" pitchFamily="18" charset="-127"/>
+                <a:ea typeface="HY견고딕" panose="02030600000101010101" pitchFamily="18" charset="-127"/>
+              </a:rPr>
+              <a:t>땀이 나는 운동을 하신 후에는 바로 선크림을 다시 발라주시고 마스크를 쓰시는 경우는 뺨 부</a:t>
+            </a:r>
+            <a:endParaRPr lang="en-US" altLang="ko-KR" sz="969" spc="-104" dirty="0">
+              <a:latin typeface="HY견고딕" panose="02030600000101010101" pitchFamily="18" charset="-127"/>
+              <a:ea typeface="HY견고딕" panose="02030600000101010101" pitchFamily="18" charset="-127"/>
+            </a:endParaRPr>
+          </a:p>
+          <a:p>
+            <a:r>
+              <a:rPr lang="ko-KR" altLang="en-US" sz="969" spc="-104" dirty="0">
+                <a:latin typeface="HY견고딕" panose="02030600000101010101" pitchFamily="18" charset="-127"/>
+                <a:ea typeface="HY견고딕" panose="02030600000101010101" pitchFamily="18" charset="-127"/>
+              </a:rPr>
+              <a:t>위의 썬크림이 지워질 수 있으니 더 자주 발라주셔야 합니다</a:t>
+            </a:r>
+            <a:r>
+              <a:rPr lang="en-US" altLang="ko-KR" sz="969" spc="-104" dirty="0">
+                <a:latin typeface="HY견고딕" panose="02030600000101010101" pitchFamily="18" charset="-127"/>
+                <a:ea typeface="HY견고딕" panose="02030600000101010101" pitchFamily="18" charset="-127"/>
+              </a:rPr>
+              <a:t>. </a:t>
+            </a:r>
+            <a:r>
+              <a:rPr lang="ko-KR" altLang="en-US" sz="969" spc="-104" dirty="0">
+                <a:latin typeface="HY견고딕" panose="02030600000101010101" pitchFamily="18" charset="-127"/>
+                <a:ea typeface="HY견고딕" panose="02030600000101010101" pitchFamily="18" charset="-127"/>
+              </a:rPr>
+              <a:t>마데카솔이나 후시딘을 추가로</a:t>
+            </a:r>
+            <a:endParaRPr lang="en-US" altLang="ko-KR" sz="969" spc="-104" dirty="0">
+              <a:latin typeface="HY견고딕" panose="02030600000101010101" pitchFamily="18" charset="-127"/>
+              <a:ea typeface="HY견고딕" panose="02030600000101010101" pitchFamily="18" charset="-127"/>
+            </a:endParaRPr>
+          </a:p>
+          <a:p>
+            <a:r>
+              <a:rPr lang="ko-KR" altLang="en-US" sz="969" spc="-104" dirty="0">
+                <a:latin typeface="HY견고딕" panose="02030600000101010101" pitchFamily="18" charset="-127"/>
+                <a:ea typeface="HY견고딕" panose="02030600000101010101" pitchFamily="18" charset="-127"/>
+              </a:rPr>
+              <a:t>발라주시면 더 빨리 피부가 회복될 수 있습니다</a:t>
+            </a:r>
+            <a:r>
+              <a:rPr lang="en-US" altLang="ko-KR" sz="969" spc="-104" dirty="0">
+                <a:latin typeface="HY견고딕" panose="02030600000101010101" pitchFamily="18" charset="-127"/>
+                <a:ea typeface="HY견고딕" panose="02030600000101010101" pitchFamily="18" charset="-127"/>
+              </a:rPr>
+              <a:t>.</a:t>
+            </a:r>
+            <a:endParaRPr lang="ko-KR" altLang="en-US" sz="969" spc="-104" dirty="0">
+              <a:latin typeface="HY견고딕" panose="02030600000101010101" pitchFamily="18" charset="-127"/>
+              <a:ea typeface="HY견고딕" panose="02030600000101010101" pitchFamily="18" charset="-127"/>
+            </a:endParaRPr>
+          </a:p>
+        </p:txBody>
+      </p:sp>
+      <p:sp>
+        <p:nvSpPr>
+          <p:cNvPr id="26" name="TextBox 25">
+            <a:extLst>
+              <a:ext uri="{FF2B5EF4-FFF2-40B4-BE49-F238E27FC236}">
+                <a16:creationId xmlns:a16="http://schemas.microsoft.com/office/drawing/2014/main" id="{5410FD11-DF03-4C3E-BBC2-57C43BFC697D}"/>
+              </a:ext>
+            </a:extLst>
+          </p:cNvPr>
+          <p:cNvSpPr txBox="1"/>
+          <p:nvPr/>
+        </p:nvSpPr>
+        <p:spPr>
+          <a:xfrm>
+            <a:off x="3773442" y="2571203"/>
+            <a:ext cx="4655712" cy="958843"/>
+          </a:xfrm>
+          <a:prstGeom prst="rect">
+            <a:avLst/>
+          </a:prstGeom>
+          <a:noFill/>
+        </p:spPr>
+        <p:txBody>
+          <a:bodyPr wrap="none" rtlCol="0">
+            <a:noAutofit/>
+          </a:bodyPr>
+          <a:lstStyle/>
+          <a:p>
+            <a:r>
+              <a:rPr lang="ko-KR" altLang="en-US" sz="969" spc="-104" dirty="0">
+                <a:latin typeface="HY견고딕" panose="02030600000101010101" pitchFamily="18" charset="-127"/>
+                <a:ea typeface="HY견고딕" panose="02030600000101010101" pitchFamily="18" charset="-127"/>
+              </a:rPr>
+              <a:t>딱지가 떨어지면 그곳이 붉게 보입니다</a:t>
+            </a:r>
+            <a:r>
+              <a:rPr lang="en-US" altLang="ko-KR" sz="969" spc="-104" dirty="0">
+                <a:latin typeface="HY견고딕" panose="02030600000101010101" pitchFamily="18" charset="-127"/>
+                <a:ea typeface="HY견고딕" panose="02030600000101010101" pitchFamily="18" charset="-127"/>
+              </a:rPr>
+              <a:t>. </a:t>
+            </a:r>
+            <a:r>
+              <a:rPr lang="ko-KR" altLang="en-US" sz="969" spc="-104" dirty="0">
+                <a:latin typeface="HY견고딕" panose="02030600000101010101" pitchFamily="18" charset="-127"/>
+                <a:ea typeface="HY견고딕" panose="02030600000101010101" pitchFamily="18" charset="-127"/>
+              </a:rPr>
+              <a:t>얼마 지난 후 그곳이 살짝 짙게 변했다가 다시 원래의</a:t>
+            </a:r>
+            <a:endParaRPr lang="en-US" altLang="ko-KR" sz="969" spc="-104" dirty="0">
+              <a:latin typeface="HY견고딕" panose="02030600000101010101" pitchFamily="18" charset="-127"/>
+              <a:ea typeface="HY견고딕" panose="02030600000101010101" pitchFamily="18" charset="-127"/>
+            </a:endParaRPr>
+          </a:p>
+          <a:p>
+            <a:r>
+              <a:rPr lang="ko-KR" altLang="en-US" sz="969" spc="-104" dirty="0">
+                <a:latin typeface="HY견고딕" panose="02030600000101010101" pitchFamily="18" charset="-127"/>
+                <a:ea typeface="HY견고딕" panose="02030600000101010101" pitchFamily="18" charset="-127"/>
+              </a:rPr>
+              <a:t>피부로 돌아옵니다</a:t>
+            </a:r>
+            <a:r>
+              <a:rPr lang="en-US" altLang="ko-KR" sz="969" spc="-104" dirty="0">
+                <a:latin typeface="HY견고딕" panose="02030600000101010101" pitchFamily="18" charset="-127"/>
+                <a:ea typeface="HY견고딕" panose="02030600000101010101" pitchFamily="18" charset="-127"/>
+              </a:rPr>
+              <a:t>. </a:t>
+            </a:r>
+            <a:r>
+              <a:rPr lang="ko-KR" altLang="en-US" sz="969" spc="-104" dirty="0">
+                <a:latin typeface="HY견고딕" panose="02030600000101010101" pitchFamily="18" charset="-127"/>
+                <a:ea typeface="HY견고딕" panose="02030600000101010101" pitchFamily="18" charset="-127"/>
+              </a:rPr>
+              <a:t>혹시 선크림을 잘 안바르시면 검게 올라옵니다</a:t>
+            </a:r>
+            <a:r>
+              <a:rPr lang="en-US" altLang="ko-KR" sz="969" spc="-104" dirty="0">
+                <a:latin typeface="HY견고딕" panose="02030600000101010101" pitchFamily="18" charset="-127"/>
+                <a:ea typeface="HY견고딕" panose="02030600000101010101" pitchFamily="18" charset="-127"/>
+              </a:rPr>
+              <a:t>.^^;</a:t>
+            </a:r>
+          </a:p>
+          <a:p>
+            <a:r>
+              <a:rPr lang="ko-KR" altLang="en-US" sz="969" spc="-104" dirty="0">
+                <a:latin typeface="HY견고딕" panose="02030600000101010101" pitchFamily="18" charset="-127"/>
+                <a:ea typeface="HY견고딕" panose="02030600000101010101" pitchFamily="18" charset="-127"/>
+              </a:rPr>
+              <a:t>이 과정이 대략 </a:t>
+            </a:r>
+            <a:r>
+              <a:rPr lang="ko-KR" altLang="en-US" sz="969" spc="-104" dirty="0">
+                <a:solidFill>
+                  <a:srgbClr val="CC3399"/>
+                </a:solidFill>
+                <a:latin typeface="HY견고딕" panose="02030600000101010101" pitchFamily="18" charset="-127"/>
+                <a:ea typeface="HY견고딕" panose="02030600000101010101" pitchFamily="18" charset="-127"/>
+              </a:rPr>
+              <a:t>세 달 정도가 소요</a:t>
+            </a:r>
+            <a:r>
+              <a:rPr lang="ko-KR" altLang="en-US" sz="969" spc="-104" dirty="0">
+                <a:latin typeface="HY견고딕" panose="02030600000101010101" pitchFamily="18" charset="-127"/>
+                <a:ea typeface="HY견고딕" panose="02030600000101010101" pitchFamily="18" charset="-127"/>
+              </a:rPr>
+              <a:t>됩니다</a:t>
+            </a:r>
+            <a:r>
+              <a:rPr lang="en-US" altLang="ko-KR" sz="969" spc="-104" dirty="0">
+                <a:latin typeface="HY견고딕" panose="02030600000101010101" pitchFamily="18" charset="-127"/>
+                <a:ea typeface="HY견고딕" panose="02030600000101010101" pitchFamily="18" charset="-127"/>
+              </a:rPr>
+              <a:t>. </a:t>
+            </a:r>
+            <a:r>
+              <a:rPr lang="ko-KR" altLang="en-US" sz="969" spc="-104" dirty="0">
+                <a:latin typeface="HY견고딕" panose="02030600000101010101" pitchFamily="18" charset="-127"/>
+                <a:ea typeface="HY견고딕" panose="02030600000101010101" pitchFamily="18" charset="-127"/>
+              </a:rPr>
+              <a:t>이는 피부의 자외선 차단 능력이 떨어져서 일어나는 </a:t>
+            </a:r>
+            <a:endParaRPr lang="en-US" altLang="ko-KR" sz="969" spc="-104" dirty="0">
+              <a:latin typeface="HY견고딕" panose="02030600000101010101" pitchFamily="18" charset="-127"/>
+              <a:ea typeface="HY견고딕" panose="02030600000101010101" pitchFamily="18" charset="-127"/>
+            </a:endParaRPr>
+          </a:p>
+          <a:p>
+            <a:r>
+              <a:rPr lang="ko-KR" altLang="en-US" sz="969" spc="-104" dirty="0">
+                <a:latin typeface="HY견고딕" panose="02030600000101010101" pitchFamily="18" charset="-127"/>
+                <a:ea typeface="HY견고딕" panose="02030600000101010101" pitchFamily="18" charset="-127"/>
+              </a:rPr>
+              <a:t>현상이며 선크림을 잘 발라주시면 이 기간을 줄이실 수 있습니다</a:t>
+            </a:r>
+            <a:r>
+              <a:rPr lang="en-US" altLang="ko-KR" sz="969" spc="-104" dirty="0">
+                <a:latin typeface="HY견고딕" panose="02030600000101010101" pitchFamily="18" charset="-127"/>
+                <a:ea typeface="HY견고딕" panose="02030600000101010101" pitchFamily="18" charset="-127"/>
+              </a:rPr>
+              <a:t>. </a:t>
+            </a:r>
+            <a:r>
+              <a:rPr lang="ko-KR" altLang="en-US" sz="969" spc="-104" dirty="0">
+                <a:latin typeface="HY견고딕" panose="02030600000101010101" pitchFamily="18" charset="-127"/>
+                <a:ea typeface="HY견고딕" panose="02030600000101010101" pitchFamily="18" charset="-127"/>
+              </a:rPr>
+              <a:t>켈로이드 체질이시거나</a:t>
+            </a:r>
+            <a:endParaRPr lang="en-US" altLang="ko-KR" sz="969" spc="-104" dirty="0">
+              <a:latin typeface="HY견고딕" panose="02030600000101010101" pitchFamily="18" charset="-127"/>
+              <a:ea typeface="HY견고딕" panose="02030600000101010101" pitchFamily="18" charset="-127"/>
+            </a:endParaRPr>
+          </a:p>
+          <a:p>
+            <a:r>
+              <a:rPr lang="ko-KR" altLang="en-US" sz="969" spc="-104" dirty="0">
+                <a:latin typeface="HY견고딕" panose="02030600000101010101" pitchFamily="18" charset="-127"/>
+                <a:ea typeface="HY견고딕" panose="02030600000101010101" pitchFamily="18" charset="-127"/>
+              </a:rPr>
+              <a:t>항암치료 받으신 적이 있는 분이나 면역력이 떨어지신 분은 이 과정이 길어질 수 있습니다</a:t>
+            </a:r>
+            <a:r>
+              <a:rPr lang="en-US" altLang="ko-KR" sz="969" spc="-104" dirty="0">
+                <a:latin typeface="HY견고딕" panose="02030600000101010101" pitchFamily="18" charset="-127"/>
+                <a:ea typeface="HY견고딕" panose="02030600000101010101" pitchFamily="18" charset="-127"/>
+              </a:rPr>
+              <a:t>.</a:t>
+            </a:r>
+          </a:p>
+          <a:p>
+            <a:r>
+              <a:rPr lang="ko-KR" altLang="en-US" sz="969" spc="-104" dirty="0">
+                <a:latin typeface="HY견고딕" panose="02030600000101010101" pitchFamily="18" charset="-127"/>
+                <a:ea typeface="HY견고딕" panose="02030600000101010101" pitchFamily="18" charset="-127"/>
+              </a:rPr>
+              <a:t>모든 상처에서 일어나는 피부 변화 과정입니다</a:t>
+            </a:r>
+            <a:r>
+              <a:rPr lang="en-US" altLang="ko-KR" sz="969" spc="-104" dirty="0">
+                <a:latin typeface="HY견고딕" panose="02030600000101010101" pitchFamily="18" charset="-127"/>
+                <a:ea typeface="HY견고딕" panose="02030600000101010101" pitchFamily="18" charset="-127"/>
+              </a:rPr>
+              <a:t>!</a:t>
+            </a:r>
+            <a:endParaRPr lang="ko-KR" altLang="en-US" sz="969" spc="-104" dirty="0">
+              <a:latin typeface="HY견고딕" panose="02030600000101010101" pitchFamily="18" charset="-127"/>
+              <a:ea typeface="HY견고딕" panose="02030600000101010101" pitchFamily="18" charset="-127"/>
+            </a:endParaRPr>
+          </a:p>
+        </p:txBody>
+      </p:sp>
+      <p:grpSp>
+        <p:nvGrpSpPr>
+          <p:cNvPr id="27" name="그룹 26">
+            <a:extLst>
+              <a:ext uri="{FF2B5EF4-FFF2-40B4-BE49-F238E27FC236}">
+                <a16:creationId xmlns:a16="http://schemas.microsoft.com/office/drawing/2014/main" id="{B7438C7D-AAA5-427F-A95C-3E04646108A8}"/>
+              </a:ext>
+            </a:extLst>
+          </p:cNvPr>
+          <p:cNvGrpSpPr/>
+          <p:nvPr/>
+        </p:nvGrpSpPr>
+        <p:grpSpPr>
+          <a:xfrm>
+            <a:off x="3834433" y="3695397"/>
+            <a:ext cx="1760485" cy="236073"/>
+            <a:chOff x="352677" y="1325880"/>
+            <a:chExt cx="1934779" cy="340995"/>
+          </a:xfrm>
+          <a:effectLst>
+            <a:outerShdw blurRad="50800" dist="38100" dir="2700000" algn="tl" rotWithShape="0">
+              <a:prstClr val="black">
+                <a:alpha val="40000"/>
+              </a:prstClr>
+            </a:outerShdw>
+          </a:effectLst>
+        </p:grpSpPr>
+        <p:sp>
+          <p:nvSpPr>
+            <p:cNvPr id="28" name="화살표: 갈매기형 수장 27">
+              <a:extLst>
+                <a:ext uri="{FF2B5EF4-FFF2-40B4-BE49-F238E27FC236}">
+                  <a16:creationId xmlns:a16="http://schemas.microsoft.com/office/drawing/2014/main" id="{8D5AC4DD-242C-4BA9-9077-6CB48EBFE241}"/>
+                </a:ext>
+              </a:extLst>
+            </p:cNvPr>
+            <p:cNvSpPr/>
+            <p:nvPr/>
+          </p:nvSpPr>
+          <p:spPr>
+            <a:xfrm flipH="1">
+              <a:off x="1997896" y="1325880"/>
+              <a:ext cx="289560" cy="340995"/>
+            </a:xfrm>
+            <a:prstGeom prst="chevron">
+              <a:avLst/>
+            </a:prstGeom>
+            <a:solidFill>
+              <a:srgbClr val="CC3399"/>
+            </a:solidFill>
+            <a:ln>
+              <a:noFill/>
+            </a:ln>
+          </p:spPr>
+          <p:style>
+            <a:lnRef idx="2">
+              <a:schemeClr val="accent1">
+                <a:shade val="50000"/>
+              </a:schemeClr>
+            </a:lnRef>
+            <a:fillRef idx="1">
+              <a:schemeClr val="accent1"/>
+            </a:fillRef>
+            <a:effectRef idx="0">
+              <a:schemeClr val="accent1"/>
+            </a:effectRef>
+            <a:fontRef idx="minor">
+              <a:schemeClr val="lt1"/>
+            </a:fontRef>
+          </p:style>
+          <p:txBody>
+            <a:bodyPr rot="0" spcFirstLastPara="0" vertOverflow="overflow" horzOverflow="overflow" vert="horz" wrap="square" lIns="63305" tIns="31652" rIns="63305" bIns="31652" numCol="1" spcCol="0" rtlCol="0" fromWordArt="0" anchor="ctr" anchorCtr="0" forceAA="0" compatLnSpc="1">
+              <a:prstTxWarp prst="textNoShape">
+                <a:avLst/>
+              </a:prstTxWarp>
+              <a:noAutofit/>
+            </a:bodyPr>
+            <a:lstStyle/>
+            <a:p>
+              <a:pPr algn="ctr"/>
+              <a:endParaRPr lang="ko-KR" altLang="en-US" sz="1246">
+                <a:solidFill>
+                  <a:schemeClr val="tx1"/>
+                </a:solidFill>
+              </a:endParaRPr>
+            </a:p>
+          </p:txBody>
+        </p:sp>
+        <p:sp>
+          <p:nvSpPr>
+            <p:cNvPr id="29" name="직사각형 28">
+              <a:extLst>
+                <a:ext uri="{FF2B5EF4-FFF2-40B4-BE49-F238E27FC236}">
+                  <a16:creationId xmlns:a16="http://schemas.microsoft.com/office/drawing/2014/main" id="{CE035C7E-66D9-436A-A031-40860ED163C9}"/>
+                </a:ext>
+              </a:extLst>
+            </p:cNvPr>
+            <p:cNvSpPr/>
+            <p:nvPr/>
+          </p:nvSpPr>
+          <p:spPr>
+            <a:xfrm>
+              <a:off x="352677" y="1325880"/>
+              <a:ext cx="1790000" cy="340995"/>
+            </a:xfrm>
+            <a:prstGeom prst="rect">
+              <a:avLst/>
+            </a:prstGeom>
+            <a:solidFill>
+              <a:srgbClr val="CC3399"/>
+            </a:solidFill>
+            <a:ln>
+              <a:noFill/>
+            </a:ln>
+          </p:spPr>
+          <p:style>
+            <a:lnRef idx="2">
+              <a:schemeClr val="accent1">
+                <a:shade val="50000"/>
+              </a:schemeClr>
+            </a:lnRef>
+            <a:fillRef idx="1">
+              <a:schemeClr val="accent1"/>
+            </a:fillRef>
+            <a:effectRef idx="0">
+              <a:schemeClr val="accent1"/>
+            </a:effectRef>
+            <a:fontRef idx="minor">
+              <a:schemeClr val="lt1"/>
+            </a:fontRef>
+          </p:style>
+          <p:txBody>
+            <a:bodyPr rot="0" spcFirstLastPara="0" vertOverflow="overflow" horzOverflow="overflow" vert="horz" wrap="square" lIns="63305" tIns="31652" rIns="63305" bIns="31652" numCol="1" spcCol="0" rtlCol="0" fromWordArt="0" anchor="ctr" anchorCtr="0" forceAA="0" compatLnSpc="1">
+              <a:prstTxWarp prst="textNoShape">
+                <a:avLst/>
+              </a:prstTxWarp>
+              <a:noAutofit/>
+            </a:bodyPr>
+            <a:lstStyle/>
+            <a:p>
+              <a:pPr algn="ctr"/>
+              <a:endParaRPr lang="ko-KR" altLang="en-US" sz="1246"/>
+            </a:p>
+          </p:txBody>
+        </p:sp>
+      </p:grpSp>
+      <p:sp>
+        <p:nvSpPr>
+          <p:cNvPr id="30" name="TextBox 29">
+            <a:extLst>
+              <a:ext uri="{FF2B5EF4-FFF2-40B4-BE49-F238E27FC236}">
+                <a16:creationId xmlns:a16="http://schemas.microsoft.com/office/drawing/2014/main" id="{4DE43E06-512E-4732-A5BD-1896DE51FA39}"/>
+              </a:ext>
+            </a:extLst>
+          </p:cNvPr>
+          <p:cNvSpPr txBox="1"/>
+          <p:nvPr/>
+        </p:nvSpPr>
+        <p:spPr>
+          <a:xfrm>
+            <a:off x="3773443" y="4004396"/>
+            <a:ext cx="4475929" cy="660536"/>
+          </a:xfrm>
+          <a:prstGeom prst="rect">
+            <a:avLst/>
+          </a:prstGeom>
+          <a:noFill/>
+        </p:spPr>
+        <p:txBody>
+          <a:bodyPr wrap="none" rtlCol="0">
+            <a:noAutofit/>
+          </a:bodyPr>
+          <a:lstStyle/>
+          <a:p>
+            <a:r>
+              <a:rPr lang="ko-KR" altLang="en-US" sz="969" spc="-104" dirty="0">
+                <a:latin typeface="HY견고딕" panose="02030600000101010101" pitchFamily="18" charset="-127"/>
+                <a:ea typeface="HY견고딕" panose="02030600000101010101" pitchFamily="18" charset="-127"/>
+              </a:rPr>
+              <a:t>시술 후 </a:t>
+            </a:r>
+            <a:r>
+              <a:rPr lang="en-US" altLang="ko-KR" sz="969" spc="-104" dirty="0">
+                <a:latin typeface="HY견고딕" panose="02030600000101010101" pitchFamily="18" charset="-127"/>
+                <a:ea typeface="HY견고딕" panose="02030600000101010101" pitchFamily="18" charset="-127"/>
+              </a:rPr>
+              <a:t>3</a:t>
+            </a:r>
+            <a:r>
+              <a:rPr lang="ko-KR" altLang="en-US" sz="969" spc="-104" dirty="0">
+                <a:latin typeface="HY견고딕" panose="02030600000101010101" pitchFamily="18" charset="-127"/>
+                <a:ea typeface="HY견고딕" panose="02030600000101010101" pitchFamily="18" charset="-127"/>
+              </a:rPr>
+              <a:t>시간 정도는 </a:t>
+            </a:r>
+            <a:r>
+              <a:rPr lang="ko-KR" altLang="en-US" sz="969" spc="-104" dirty="0">
+                <a:solidFill>
+                  <a:srgbClr val="CC3399"/>
+                </a:solidFill>
+                <a:latin typeface="HY견고딕" panose="02030600000101010101" pitchFamily="18" charset="-127"/>
+                <a:ea typeface="HY견고딕" panose="02030600000101010101" pitchFamily="18" charset="-127"/>
+              </a:rPr>
+              <a:t>얼굴이 화끈거리는 열감이나 약간의 붓기</a:t>
+            </a:r>
+            <a:r>
+              <a:rPr lang="en-US" altLang="ko-KR" sz="969" spc="-104" dirty="0">
+                <a:solidFill>
+                  <a:srgbClr val="CC3399"/>
+                </a:solidFill>
+                <a:latin typeface="HY견고딕" panose="02030600000101010101" pitchFamily="18" charset="-127"/>
+                <a:ea typeface="HY견고딕" panose="02030600000101010101" pitchFamily="18" charset="-127"/>
+              </a:rPr>
+              <a:t>, </a:t>
+            </a:r>
+            <a:r>
+              <a:rPr lang="ko-KR" altLang="en-US" sz="969" spc="-104" dirty="0">
+                <a:solidFill>
+                  <a:srgbClr val="CC3399"/>
+                </a:solidFill>
+                <a:latin typeface="HY견고딕" panose="02030600000101010101" pitchFamily="18" charset="-127"/>
+                <a:ea typeface="HY견고딕" panose="02030600000101010101" pitchFamily="18" charset="-127"/>
+              </a:rPr>
+              <a:t>통증</a:t>
+            </a:r>
+            <a:r>
+              <a:rPr lang="ko-KR" altLang="en-US" sz="969" spc="-104" dirty="0">
+                <a:latin typeface="HY견고딕" panose="02030600000101010101" pitchFamily="18" charset="-127"/>
+                <a:ea typeface="HY견고딕" panose="02030600000101010101" pitchFamily="18" charset="-127"/>
+              </a:rPr>
+              <a:t>이 있을 수 있습니다</a:t>
+            </a:r>
+            <a:r>
+              <a:rPr lang="en-US" altLang="ko-KR" sz="969" spc="-104" dirty="0">
+                <a:latin typeface="HY견고딕" panose="02030600000101010101" pitchFamily="18" charset="-127"/>
+                <a:ea typeface="HY견고딕" panose="02030600000101010101" pitchFamily="18" charset="-127"/>
+              </a:rPr>
+              <a:t>.</a:t>
+            </a:r>
+          </a:p>
+          <a:p>
+            <a:r>
+              <a:rPr lang="ko-KR" altLang="en-US" sz="969" spc="-104" dirty="0">
+                <a:latin typeface="HY견고딕" panose="02030600000101010101" pitchFamily="18" charset="-127"/>
+                <a:ea typeface="HY견고딕" panose="02030600000101010101" pitchFamily="18" charset="-127"/>
+              </a:rPr>
+              <a:t>처방해드린 약을 복용하시면 통증과 알레르기 반응이 가라앉습니다</a:t>
+            </a:r>
+            <a:r>
+              <a:rPr lang="en-US" altLang="ko-KR" sz="969" spc="-104" dirty="0">
+                <a:latin typeface="HY견고딕" panose="02030600000101010101" pitchFamily="18" charset="-127"/>
+                <a:ea typeface="HY견고딕" panose="02030600000101010101" pitchFamily="18" charset="-127"/>
+              </a:rPr>
+              <a:t>.</a:t>
+            </a:r>
+          </a:p>
+          <a:p>
+            <a:r>
+              <a:rPr lang="ko-KR" altLang="en-US" sz="969" spc="-104" dirty="0">
+                <a:latin typeface="HY견고딕" panose="02030600000101010101" pitchFamily="18" charset="-127"/>
+                <a:ea typeface="HY견고딕" panose="02030600000101010101" pitchFamily="18" charset="-127"/>
+              </a:rPr>
+              <a:t>시술 후에는 </a:t>
+            </a:r>
+            <a:r>
+              <a:rPr lang="ko-KR" altLang="en-US" sz="969" spc="-104" dirty="0">
+                <a:solidFill>
+                  <a:srgbClr val="CC3399"/>
+                </a:solidFill>
+                <a:latin typeface="HY견고딕" panose="02030600000101010101" pitchFamily="18" charset="-127"/>
+                <a:ea typeface="HY견고딕" panose="02030600000101010101" pitchFamily="18" charset="-127"/>
+              </a:rPr>
+              <a:t>시술 전용 화장품을 쓰시는 것을 권장</a:t>
+            </a:r>
+            <a:r>
+              <a:rPr lang="ko-KR" altLang="en-US" sz="969" spc="-104" dirty="0">
+                <a:latin typeface="HY견고딕" panose="02030600000101010101" pitchFamily="18" charset="-127"/>
+                <a:ea typeface="HY견고딕" panose="02030600000101010101" pitchFamily="18" charset="-127"/>
+              </a:rPr>
+              <a:t>합니다</a:t>
+            </a:r>
+            <a:r>
+              <a:rPr lang="en-US" altLang="ko-KR" sz="969" spc="-104" dirty="0">
+                <a:latin typeface="HY견고딕" panose="02030600000101010101" pitchFamily="18" charset="-127"/>
+                <a:ea typeface="HY견고딕" panose="02030600000101010101" pitchFamily="18" charset="-127"/>
+              </a:rPr>
+              <a:t>.</a:t>
+            </a:r>
+          </a:p>
+          <a:p>
+            <a:r>
+              <a:rPr lang="ko-KR" altLang="en-US" sz="969" spc="-104" dirty="0">
+                <a:latin typeface="HY견고딕" panose="02030600000101010101" pitchFamily="18" charset="-127"/>
+                <a:ea typeface="HY견고딕" panose="02030600000101010101" pitchFamily="18" charset="-127"/>
+              </a:rPr>
+              <a:t>평상시에 문제가 전혀 없었던 화장품도 시술 후에는 문제가 되는 경우가 있습니다</a:t>
+            </a:r>
+            <a:r>
+              <a:rPr lang="en-US" altLang="ko-KR" sz="969" spc="-104" dirty="0">
+                <a:latin typeface="HY견고딕" panose="02030600000101010101" pitchFamily="18" charset="-127"/>
+                <a:ea typeface="HY견고딕" panose="02030600000101010101" pitchFamily="18" charset="-127"/>
+              </a:rPr>
+              <a:t>.</a:t>
+            </a:r>
+            <a:endParaRPr lang="ko-KR" altLang="en-US" sz="969" spc="-104" dirty="0">
+              <a:latin typeface="HY견고딕" panose="02030600000101010101" pitchFamily="18" charset="-127"/>
+              <a:ea typeface="HY견고딕" panose="02030600000101010101" pitchFamily="18" charset="-127"/>
+            </a:endParaRPr>
+          </a:p>
+        </p:txBody>
+      </p:sp>
+      <p:sp>
+        <p:nvSpPr>
+          <p:cNvPr id="31" name="TextBox 30">
+            <a:extLst>
+              <a:ext uri="{FF2B5EF4-FFF2-40B4-BE49-F238E27FC236}">
+                <a16:creationId xmlns:a16="http://schemas.microsoft.com/office/drawing/2014/main" id="{D955776A-5B85-42D6-A3E7-041B5CB85D67}"/>
+              </a:ext>
+            </a:extLst>
+          </p:cNvPr>
+          <p:cNvSpPr txBox="1"/>
+          <p:nvPr/>
+        </p:nvSpPr>
+        <p:spPr>
+          <a:xfrm>
+            <a:off x="3762845" y="3683393"/>
+            <a:ext cx="1714697" cy="262829"/>
+          </a:xfrm>
+          <a:prstGeom prst="rect">
+            <a:avLst/>
+          </a:prstGeom>
+          <a:noFill/>
+        </p:spPr>
+        <p:txBody>
+          <a:bodyPr wrap="square" rtlCol="0">
+            <a:spAutoFit/>
+          </a:bodyPr>
+          <a:lstStyle/>
+          <a:p>
+            <a:pPr algn="ctr"/>
+            <a:r>
+              <a:rPr lang="ko-KR" altLang="en-US" sz="1108" b="1" spc="-104" dirty="0">
+                <a:solidFill>
+                  <a:schemeClr val="bg1"/>
+                </a:solidFill>
+                <a:latin typeface="HY엽서M" panose="02030600000101010101" pitchFamily="18" charset="-127"/>
+                <a:ea typeface="HY엽서M" panose="02030600000101010101" pitchFamily="18" charset="-127"/>
+              </a:rPr>
+              <a:t>시술 후</a:t>
+            </a:r>
+            <a:r>
+              <a:rPr lang="en-US" altLang="ko-KR" sz="1108" b="1" spc="-104" dirty="0">
+                <a:solidFill>
+                  <a:schemeClr val="bg1"/>
+                </a:solidFill>
+                <a:latin typeface="HY엽서M" panose="02030600000101010101" pitchFamily="18" charset="-127"/>
+                <a:ea typeface="HY엽서M" panose="02030600000101010101" pitchFamily="18" charset="-127"/>
+              </a:rPr>
+              <a:t>, </a:t>
+            </a:r>
+            <a:r>
+              <a:rPr lang="ko-KR" altLang="en-US" sz="1108" b="1" spc="-104" dirty="0">
+                <a:solidFill>
+                  <a:schemeClr val="bg1"/>
+                </a:solidFill>
+                <a:latin typeface="HY엽서M" panose="02030600000101010101" pitchFamily="18" charset="-127"/>
+                <a:ea typeface="HY엽서M" panose="02030600000101010101" pitchFamily="18" charset="-127"/>
+              </a:rPr>
+              <a:t>화장품 사용안내</a:t>
+            </a:r>
+          </a:p>
+        </p:txBody>
+      </p:sp>
+      <p:grpSp>
+        <p:nvGrpSpPr>
+          <p:cNvPr id="34" name="그룹 33">
+            <a:extLst>
+              <a:ext uri="{FF2B5EF4-FFF2-40B4-BE49-F238E27FC236}">
+                <a16:creationId xmlns:a16="http://schemas.microsoft.com/office/drawing/2014/main" id="{11F9C555-7E20-42BA-BFE1-150C937A6BFD}"/>
+              </a:ext>
+            </a:extLst>
+          </p:cNvPr>
+          <p:cNvGrpSpPr/>
+          <p:nvPr/>
+        </p:nvGrpSpPr>
+        <p:grpSpPr>
+          <a:xfrm>
+            <a:off x="3830811" y="4748387"/>
+            <a:ext cx="1760485" cy="236073"/>
+            <a:chOff x="352677" y="1325880"/>
+            <a:chExt cx="1934779" cy="340995"/>
+          </a:xfrm>
+          <a:effectLst>
+            <a:outerShdw blurRad="50800" dist="38100" dir="2700000" algn="tl" rotWithShape="0">
+              <a:prstClr val="black">
+                <a:alpha val="40000"/>
+              </a:prstClr>
+            </a:outerShdw>
+          </a:effectLst>
+        </p:grpSpPr>
+        <p:sp>
+          <p:nvSpPr>
+            <p:cNvPr id="35" name="화살표: 갈매기형 수장 34">
+              <a:extLst>
+                <a:ext uri="{FF2B5EF4-FFF2-40B4-BE49-F238E27FC236}">
+                  <a16:creationId xmlns:a16="http://schemas.microsoft.com/office/drawing/2014/main" id="{79AEA098-3A48-42BC-9419-F6BF79FDF4A1}"/>
+                </a:ext>
+              </a:extLst>
+            </p:cNvPr>
+            <p:cNvSpPr/>
+            <p:nvPr/>
+          </p:nvSpPr>
+          <p:spPr>
+            <a:xfrm flipH="1">
+              <a:off x="1997896" y="1325880"/>
+              <a:ext cx="289560" cy="340995"/>
+            </a:xfrm>
+            <a:prstGeom prst="chevron">
+              <a:avLst/>
+            </a:prstGeom>
+            <a:solidFill>
+              <a:srgbClr val="CC3399"/>
+            </a:solidFill>
+            <a:ln>
+              <a:noFill/>
+            </a:ln>
+          </p:spPr>
+          <p:style>
+            <a:lnRef idx="2">
+              <a:schemeClr val="accent1">
+                <a:shade val="50000"/>
+              </a:schemeClr>
+            </a:lnRef>
+            <a:fillRef idx="1">
+              <a:schemeClr val="accent1"/>
+            </a:fillRef>
+            <a:effectRef idx="0">
+              <a:schemeClr val="accent1"/>
+            </a:effectRef>
+            <a:fontRef idx="minor">
+              <a:schemeClr val="lt1"/>
+            </a:fontRef>
+          </p:style>
+          <p:txBody>
+            <a:bodyPr rot="0" spcFirstLastPara="0" vertOverflow="overflow" horzOverflow="overflow" vert="horz" wrap="square" lIns="63305" tIns="31652" rIns="63305" bIns="31652" numCol="1" spcCol="0" rtlCol="0" fromWordArt="0" anchor="ctr" anchorCtr="0" forceAA="0" compatLnSpc="1">
+              <a:prstTxWarp prst="textNoShape">
+                <a:avLst/>
+              </a:prstTxWarp>
+              <a:noAutofit/>
+            </a:bodyPr>
+            <a:lstStyle/>
+            <a:p>
+              <a:pPr algn="ctr"/>
+              <a:endParaRPr lang="ko-KR" altLang="en-US" sz="1246">
+                <a:solidFill>
+                  <a:schemeClr val="tx1"/>
+                </a:solidFill>
+              </a:endParaRPr>
+            </a:p>
+          </p:txBody>
+        </p:sp>
+        <p:sp>
+          <p:nvSpPr>
+            <p:cNvPr id="36" name="직사각형 35">
+              <a:extLst>
+                <a:ext uri="{FF2B5EF4-FFF2-40B4-BE49-F238E27FC236}">
+                  <a16:creationId xmlns:a16="http://schemas.microsoft.com/office/drawing/2014/main" id="{778785E1-AEDC-4D25-B9F7-C20D24A579C2}"/>
+                </a:ext>
+              </a:extLst>
+            </p:cNvPr>
+            <p:cNvSpPr/>
+            <p:nvPr/>
+          </p:nvSpPr>
+          <p:spPr>
+            <a:xfrm>
+              <a:off x="352677" y="1325880"/>
+              <a:ext cx="1790000" cy="340995"/>
+            </a:xfrm>
+            <a:prstGeom prst="rect">
+              <a:avLst/>
+            </a:prstGeom>
+            <a:solidFill>
+              <a:srgbClr val="CC3399"/>
+            </a:solidFill>
+            <a:ln>
+              <a:noFill/>
+            </a:ln>
+          </p:spPr>
+          <p:style>
+            <a:lnRef idx="2">
+              <a:schemeClr val="accent1">
+                <a:shade val="50000"/>
+              </a:schemeClr>
+            </a:lnRef>
+            <a:fillRef idx="1">
+              <a:schemeClr val="accent1"/>
+            </a:fillRef>
+            <a:effectRef idx="0">
+              <a:schemeClr val="accent1"/>
+            </a:effectRef>
+            <a:fontRef idx="minor">
+              <a:schemeClr val="lt1"/>
+            </a:fontRef>
+          </p:style>
+          <p:txBody>
+            <a:bodyPr rot="0" spcFirstLastPara="0" vertOverflow="overflow" horzOverflow="overflow" vert="horz" wrap="square" lIns="63305" tIns="31652" rIns="63305" bIns="31652" numCol="1" spcCol="0" rtlCol="0" fromWordArt="0" anchor="ctr" anchorCtr="0" forceAA="0" compatLnSpc="1">
+              <a:prstTxWarp prst="textNoShape">
+                <a:avLst/>
+              </a:prstTxWarp>
+              <a:noAutofit/>
+            </a:bodyPr>
+            <a:lstStyle/>
+            <a:p>
+              <a:pPr algn="ctr"/>
+              <a:endParaRPr lang="ko-KR" altLang="en-US" sz="1246"/>
+            </a:p>
+          </p:txBody>
+        </p:sp>
+      </p:grpSp>
+      <p:sp>
+        <p:nvSpPr>
+          <p:cNvPr id="37" name="TextBox 36">
+            <a:extLst>
+              <a:ext uri="{FF2B5EF4-FFF2-40B4-BE49-F238E27FC236}">
+                <a16:creationId xmlns:a16="http://schemas.microsoft.com/office/drawing/2014/main" id="{CFA9A1A8-C9F0-43D6-BFD3-E328C34F7C95}"/>
+              </a:ext>
+            </a:extLst>
+          </p:cNvPr>
+          <p:cNvSpPr txBox="1"/>
+          <p:nvPr/>
+        </p:nvSpPr>
+        <p:spPr>
+          <a:xfrm>
+            <a:off x="3769820" y="5057385"/>
+            <a:ext cx="3151972" cy="362229"/>
+          </a:xfrm>
+          <a:prstGeom prst="rect">
+            <a:avLst/>
+          </a:prstGeom>
+          <a:noFill/>
+        </p:spPr>
+        <p:txBody>
+          <a:bodyPr wrap="none" rtlCol="0">
+            <a:noAutofit/>
+          </a:bodyPr>
+          <a:lstStyle/>
+          <a:p>
+            <a:r>
+              <a:rPr lang="ko-KR" altLang="en-US" sz="969" spc="-104" dirty="0">
+                <a:latin typeface="HY견고딕" panose="02030600000101010101" pitchFamily="18" charset="-127"/>
+                <a:ea typeface="HY견고딕" panose="02030600000101010101" pitchFamily="18" charset="-127"/>
+              </a:rPr>
+              <a:t>위의 올인원 미백 시술을 받으신 후에는 대략 여섯 달 간격으로</a:t>
+            </a:r>
+            <a:endParaRPr lang="en-US" altLang="ko-KR" sz="969" spc="-104" dirty="0">
+              <a:latin typeface="HY견고딕" panose="02030600000101010101" pitchFamily="18" charset="-127"/>
+              <a:ea typeface="HY견고딕" panose="02030600000101010101" pitchFamily="18" charset="-127"/>
+            </a:endParaRPr>
+          </a:p>
+          <a:p>
+            <a:r>
+              <a:rPr lang="ko-KR" altLang="en-US" sz="969" spc="-104" dirty="0">
+                <a:latin typeface="HY견고딕" panose="02030600000101010101" pitchFamily="18" charset="-127"/>
+                <a:ea typeface="HY견고딕" panose="02030600000101010101" pitchFamily="18" charset="-127"/>
+              </a:rPr>
+              <a:t>올인원 시술을 받으시는 것을 권장합니다</a:t>
+            </a:r>
+            <a:r>
+              <a:rPr lang="en-US" altLang="ko-KR" sz="969" spc="-104" dirty="0">
+                <a:latin typeface="HY견고딕" panose="02030600000101010101" pitchFamily="18" charset="-127"/>
+                <a:ea typeface="HY견고딕" panose="02030600000101010101" pitchFamily="18" charset="-127"/>
+              </a:rPr>
+              <a:t>.</a:t>
+            </a:r>
+            <a:endParaRPr lang="ko-KR" altLang="en-US" sz="969" spc="-104" dirty="0">
+              <a:latin typeface="HY견고딕" panose="02030600000101010101" pitchFamily="18" charset="-127"/>
+              <a:ea typeface="HY견고딕" panose="02030600000101010101" pitchFamily="18" charset="-127"/>
+            </a:endParaRPr>
+          </a:p>
+        </p:txBody>
+      </p:sp>
+      <p:sp>
+        <p:nvSpPr>
+          <p:cNvPr id="38" name="TextBox 37">
+            <a:extLst>
+              <a:ext uri="{FF2B5EF4-FFF2-40B4-BE49-F238E27FC236}">
+                <a16:creationId xmlns:a16="http://schemas.microsoft.com/office/drawing/2014/main" id="{76BB1D46-FE62-40F8-BB9F-97E8C2861DFC}"/>
+              </a:ext>
+            </a:extLst>
+          </p:cNvPr>
+          <p:cNvSpPr txBox="1"/>
+          <p:nvPr/>
+        </p:nvSpPr>
+        <p:spPr>
+          <a:xfrm>
+            <a:off x="3773953" y="4736382"/>
+            <a:ext cx="1714697" cy="262829"/>
+          </a:xfrm>
+          <a:prstGeom prst="rect">
+            <a:avLst/>
+          </a:prstGeom>
+          <a:noFill/>
+        </p:spPr>
+        <p:txBody>
+          <a:bodyPr wrap="square" rtlCol="0">
+            <a:spAutoFit/>
+          </a:bodyPr>
+          <a:lstStyle/>
+          <a:p>
+            <a:pPr algn="ctr"/>
+            <a:r>
+              <a:rPr lang="ko-KR" altLang="en-US" sz="1108" b="1" spc="-104" dirty="0">
+                <a:solidFill>
+                  <a:schemeClr val="bg1"/>
+                </a:solidFill>
+                <a:latin typeface="HY엽서M" panose="02030600000101010101" pitchFamily="18" charset="-127"/>
+                <a:ea typeface="HY엽서M" panose="02030600000101010101" pitchFamily="18" charset="-127"/>
+              </a:rPr>
+              <a:t>올인원 미백시술 권장주기</a:t>
+            </a:r>
+          </a:p>
+        </p:txBody>
+      </p:sp>
+      <p:grpSp>
+        <p:nvGrpSpPr>
+          <p:cNvPr id="43" name="그룹 42">
+            <a:extLst>
+              <a:ext uri="{FF2B5EF4-FFF2-40B4-BE49-F238E27FC236}">
+                <a16:creationId xmlns:a16="http://schemas.microsoft.com/office/drawing/2014/main" id="{E6FE1721-7A56-4740-9A42-D8F72CAC0BE7}"/>
+              </a:ext>
+            </a:extLst>
+          </p:cNvPr>
+          <p:cNvGrpSpPr/>
+          <p:nvPr/>
+        </p:nvGrpSpPr>
+        <p:grpSpPr>
+          <a:xfrm>
+            <a:off x="3827188" y="5518238"/>
+            <a:ext cx="1760485" cy="236073"/>
+            <a:chOff x="352677" y="1325880"/>
+            <a:chExt cx="1934779" cy="340995"/>
+          </a:xfrm>
+          <a:effectLst>
+            <a:outerShdw blurRad="50800" dist="38100" dir="2700000" algn="tl" rotWithShape="0">
+              <a:prstClr val="black">
+                <a:alpha val="40000"/>
+              </a:prstClr>
+            </a:outerShdw>
+          </a:effectLst>
+        </p:grpSpPr>
+        <p:sp>
+          <p:nvSpPr>
+            <p:cNvPr id="44" name="화살표: 갈매기형 수장 43">
+              <a:extLst>
+                <a:ext uri="{FF2B5EF4-FFF2-40B4-BE49-F238E27FC236}">
+                  <a16:creationId xmlns:a16="http://schemas.microsoft.com/office/drawing/2014/main" id="{E4175D44-83E6-4C6C-B367-4D74DAF16F78}"/>
+                </a:ext>
+              </a:extLst>
+            </p:cNvPr>
+            <p:cNvSpPr/>
+            <p:nvPr/>
+          </p:nvSpPr>
+          <p:spPr>
+            <a:xfrm flipH="1">
+              <a:off x="1997896" y="1325880"/>
+              <a:ext cx="289560" cy="340995"/>
+            </a:xfrm>
+            <a:prstGeom prst="chevron">
+              <a:avLst/>
+            </a:prstGeom>
+            <a:solidFill>
+              <a:srgbClr val="CC3399"/>
+            </a:solidFill>
+            <a:ln>
+              <a:noFill/>
+            </a:ln>
+          </p:spPr>
+          <p:style>
+            <a:lnRef idx="2">
+              <a:schemeClr val="accent1">
+                <a:shade val="50000"/>
+              </a:schemeClr>
+            </a:lnRef>
+            <a:fillRef idx="1">
+              <a:schemeClr val="accent1"/>
+            </a:fillRef>
+            <a:effectRef idx="0">
+              <a:schemeClr val="accent1"/>
+            </a:effectRef>
+            <a:fontRef idx="minor">
+              <a:schemeClr val="lt1"/>
+            </a:fontRef>
+          </p:style>
+          <p:txBody>
+            <a:bodyPr rot="0" spcFirstLastPara="0" vertOverflow="overflow" horzOverflow="overflow" vert="horz" wrap="square" lIns="63305" tIns="31652" rIns="63305" bIns="31652" numCol="1" spcCol="0" rtlCol="0" fromWordArt="0" anchor="ctr" anchorCtr="0" forceAA="0" compatLnSpc="1">
+              <a:prstTxWarp prst="textNoShape">
+                <a:avLst/>
+              </a:prstTxWarp>
+              <a:noAutofit/>
+            </a:bodyPr>
+            <a:lstStyle/>
+            <a:p>
+              <a:pPr algn="ctr"/>
+              <a:endParaRPr lang="ko-KR" altLang="en-US" sz="1246">
+                <a:solidFill>
+                  <a:schemeClr val="tx1"/>
+                </a:solidFill>
+              </a:endParaRPr>
+            </a:p>
+          </p:txBody>
+        </p:sp>
+        <p:sp>
+          <p:nvSpPr>
+            <p:cNvPr id="45" name="직사각형 44">
+              <a:extLst>
+                <a:ext uri="{FF2B5EF4-FFF2-40B4-BE49-F238E27FC236}">
+                  <a16:creationId xmlns:a16="http://schemas.microsoft.com/office/drawing/2014/main" id="{B9B02763-D46D-47E3-B9C8-FF106C0B3A64}"/>
+                </a:ext>
+              </a:extLst>
+            </p:cNvPr>
+            <p:cNvSpPr/>
+            <p:nvPr/>
+          </p:nvSpPr>
+          <p:spPr>
+            <a:xfrm>
+              <a:off x="352677" y="1325880"/>
+              <a:ext cx="1790000" cy="340995"/>
+            </a:xfrm>
+            <a:prstGeom prst="rect">
+              <a:avLst/>
+            </a:prstGeom>
+            <a:solidFill>
+              <a:srgbClr val="CC3399"/>
+            </a:solidFill>
+            <a:ln>
+              <a:noFill/>
+            </a:ln>
+          </p:spPr>
+          <p:style>
+            <a:lnRef idx="2">
+              <a:schemeClr val="accent1">
+                <a:shade val="50000"/>
+              </a:schemeClr>
+            </a:lnRef>
+            <a:fillRef idx="1">
+              <a:schemeClr val="accent1"/>
+            </a:fillRef>
+            <a:effectRef idx="0">
+              <a:schemeClr val="accent1"/>
+            </a:effectRef>
+            <a:fontRef idx="minor">
+              <a:schemeClr val="lt1"/>
+            </a:fontRef>
+          </p:style>
+          <p:txBody>
+            <a:bodyPr rot="0" spcFirstLastPara="0" vertOverflow="overflow" horzOverflow="overflow" vert="horz" wrap="square" lIns="63305" tIns="31652" rIns="63305" bIns="31652" numCol="1" spcCol="0" rtlCol="0" fromWordArt="0" anchor="ctr" anchorCtr="0" forceAA="0" compatLnSpc="1">
+              <a:prstTxWarp prst="textNoShape">
+                <a:avLst/>
+              </a:prstTxWarp>
+              <a:noAutofit/>
+            </a:bodyPr>
+            <a:lstStyle/>
+            <a:p>
+              <a:pPr algn="ctr"/>
+              <a:endParaRPr lang="ko-KR" altLang="en-US" sz="1246"/>
+            </a:p>
+          </p:txBody>
+        </p:sp>
+      </p:grpSp>
+      <p:sp>
+        <p:nvSpPr>
+          <p:cNvPr id="46" name="TextBox 45">
+            <a:extLst>
+              <a:ext uri="{FF2B5EF4-FFF2-40B4-BE49-F238E27FC236}">
+                <a16:creationId xmlns:a16="http://schemas.microsoft.com/office/drawing/2014/main" id="{63E0A36B-9F00-45AD-BD56-33259074B80F}"/>
+              </a:ext>
+            </a:extLst>
+          </p:cNvPr>
+          <p:cNvSpPr txBox="1"/>
+          <p:nvPr/>
+        </p:nvSpPr>
+        <p:spPr>
+          <a:xfrm>
+            <a:off x="3766197" y="5827237"/>
+            <a:ext cx="4539187" cy="362229"/>
+          </a:xfrm>
+          <a:prstGeom prst="rect">
+            <a:avLst/>
+          </a:prstGeom>
+          <a:noFill/>
+        </p:spPr>
+        <p:txBody>
+          <a:bodyPr wrap="none" rtlCol="0">
+            <a:noAutofit/>
+          </a:bodyPr>
+          <a:lstStyle/>
+          <a:p>
+            <a:r>
+              <a:rPr lang="ko-KR" altLang="en-US" sz="969" spc="-104" dirty="0">
+                <a:latin typeface="HY견고딕" panose="02030600000101010101" pitchFamily="18" charset="-127"/>
+                <a:ea typeface="HY견고딕" panose="02030600000101010101" pitchFamily="18" charset="-127"/>
+              </a:rPr>
+              <a:t>올인원 미백 시술 이외에 재생관리</a:t>
+            </a:r>
+            <a:r>
+              <a:rPr lang="en-US" altLang="ko-KR" sz="969" spc="-104" dirty="0">
+                <a:latin typeface="HY견고딕" panose="02030600000101010101" pitchFamily="18" charset="-127"/>
+                <a:ea typeface="HY견고딕" panose="02030600000101010101" pitchFamily="18" charset="-127"/>
+              </a:rPr>
+              <a:t>, </a:t>
+            </a:r>
+            <a:r>
+              <a:rPr lang="ko-KR" altLang="en-US" sz="969" spc="-104" dirty="0">
+                <a:latin typeface="HY견고딕" panose="02030600000101010101" pitchFamily="18" charset="-127"/>
+                <a:ea typeface="HY견고딕" panose="02030600000101010101" pitchFamily="18" charset="-127"/>
+              </a:rPr>
+              <a:t>자가혈피부재생술</a:t>
+            </a:r>
+            <a:r>
+              <a:rPr lang="en-US" altLang="ko-KR" sz="969" spc="-104" dirty="0">
+                <a:latin typeface="HY견고딕" panose="02030600000101010101" pitchFamily="18" charset="-127"/>
+                <a:ea typeface="HY견고딕" panose="02030600000101010101" pitchFamily="18" charset="-127"/>
+              </a:rPr>
+              <a:t>, </a:t>
+            </a:r>
+            <a:r>
+              <a:rPr lang="ko-KR" altLang="en-US" sz="969" spc="-104" dirty="0">
+                <a:latin typeface="HY견고딕" panose="02030600000101010101" pitchFamily="18" charset="-127"/>
+                <a:ea typeface="HY견고딕" panose="02030600000101010101" pitchFamily="18" charset="-127"/>
+              </a:rPr>
+              <a:t>프락셀 플러스 등의</a:t>
+            </a:r>
+            <a:endParaRPr lang="en-US" altLang="ko-KR" sz="969" spc="-104" dirty="0">
+              <a:latin typeface="HY견고딕" panose="02030600000101010101" pitchFamily="18" charset="-127"/>
+              <a:ea typeface="HY견고딕" panose="02030600000101010101" pitchFamily="18" charset="-127"/>
+            </a:endParaRPr>
+          </a:p>
+          <a:p>
+            <a:r>
+              <a:rPr lang="ko-KR" altLang="en-US" sz="969" spc="-104" dirty="0">
+                <a:latin typeface="HY견고딕" panose="02030600000101010101" pitchFamily="18" charset="-127"/>
+                <a:ea typeface="HY견고딕" panose="02030600000101010101" pitchFamily="18" charset="-127"/>
+              </a:rPr>
+              <a:t>추가 시술을 받으실 수 있고 이 시술들은 다음날부터 일상생활에 표시가 안나는 시술입니다</a:t>
+            </a:r>
+            <a:r>
+              <a:rPr lang="en-US" altLang="ko-KR" sz="969" spc="-104" dirty="0">
+                <a:latin typeface="HY견고딕" panose="02030600000101010101" pitchFamily="18" charset="-127"/>
+                <a:ea typeface="HY견고딕" panose="02030600000101010101" pitchFamily="18" charset="-127"/>
+              </a:rPr>
+              <a:t>.</a:t>
+            </a:r>
+            <a:endParaRPr lang="ko-KR" altLang="en-US" sz="969" spc="-104" dirty="0">
+              <a:latin typeface="HY견고딕" panose="02030600000101010101" pitchFamily="18" charset="-127"/>
+              <a:ea typeface="HY견고딕" panose="02030600000101010101" pitchFamily="18" charset="-127"/>
+            </a:endParaRPr>
+          </a:p>
+        </p:txBody>
+      </p:sp>
+      <p:sp>
+        <p:nvSpPr>
+          <p:cNvPr id="47" name="TextBox 46">
+            <a:extLst>
+              <a:ext uri="{FF2B5EF4-FFF2-40B4-BE49-F238E27FC236}">
+                <a16:creationId xmlns:a16="http://schemas.microsoft.com/office/drawing/2014/main" id="{953E5404-ACE9-4ECA-85C2-AE9F4754FAC4}"/>
+              </a:ext>
+            </a:extLst>
+          </p:cNvPr>
+          <p:cNvSpPr txBox="1"/>
+          <p:nvPr/>
+        </p:nvSpPr>
+        <p:spPr>
+          <a:xfrm>
+            <a:off x="3805011" y="5506234"/>
+            <a:ext cx="1029654" cy="262829"/>
+          </a:xfrm>
+          <a:prstGeom prst="rect">
+            <a:avLst/>
+          </a:prstGeom>
+          <a:noFill/>
+        </p:spPr>
+        <p:txBody>
+          <a:bodyPr wrap="square" rtlCol="0">
+            <a:spAutoFit/>
+          </a:bodyPr>
+          <a:lstStyle/>
+          <a:p>
+            <a:pPr algn="ctr"/>
+            <a:r>
+              <a:rPr lang="ko-KR" altLang="en-US" sz="1108" b="1" spc="-104">
+                <a:solidFill>
+                  <a:schemeClr val="bg1"/>
+                </a:solidFill>
+                <a:latin typeface="HY엽서M" panose="02030600000101010101" pitchFamily="18" charset="-127"/>
+                <a:ea typeface="HY엽서M" panose="02030600000101010101" pitchFamily="18" charset="-127"/>
+              </a:rPr>
+              <a:t>추가시술 안내</a:t>
+            </a:r>
+            <a:endParaRPr lang="ko-KR" altLang="en-US" sz="1108" b="1" spc="-104" dirty="0">
+              <a:solidFill>
+                <a:schemeClr val="bg1"/>
+              </a:solidFill>
+              <a:latin typeface="HY엽서M" panose="02030600000101010101" pitchFamily="18" charset="-127"/>
+              <a:ea typeface="HY엽서M" panose="02030600000101010101" pitchFamily="18" charset="-127"/>
+            </a:endParaRPr>
+          </a:p>
+        </p:txBody>
+      </p:sp>
+      <p:sp>
+        <p:nvSpPr>
+          <p:cNvPr id="48" name="직사각형 47">
+            <a:extLst>
+              <a:ext uri="{FF2B5EF4-FFF2-40B4-BE49-F238E27FC236}">
+                <a16:creationId xmlns:a16="http://schemas.microsoft.com/office/drawing/2014/main" id="{95CD4816-1BA0-4CA9-A6A6-3AB1580BBD14}"/>
+              </a:ext>
+            </a:extLst>
+          </p:cNvPr>
+          <p:cNvSpPr/>
+          <p:nvPr/>
+        </p:nvSpPr>
+        <p:spPr>
+          <a:xfrm>
+            <a:off x="3722077" y="6495771"/>
+            <a:ext cx="4747846" cy="362229"/>
+          </a:xfrm>
+          <a:prstGeom prst="rect">
+            <a:avLst/>
+          </a:prstGeom>
+          <a:solidFill>
+            <a:srgbClr val="702B77"/>
+          </a:solidFill>
+          <a:ln>
+            <a:noFill/>
+          </a:ln>
+        </p:spPr>
+        <p:style>
+          <a:lnRef idx="2">
+            <a:schemeClr val="accent1">
+              <a:shade val="50000"/>
+            </a:schemeClr>
+          </a:lnRef>
+          <a:fillRef idx="1">
+            <a:schemeClr val="accent1"/>
+          </a:fillRef>
+          <a:effectRef idx="0">
+            <a:schemeClr val="accent1"/>
+          </a:effectRef>
+          <a:fontRef idx="minor">
+            <a:schemeClr val="lt1"/>
+          </a:fontRef>
+        </p:style>
+        <p:txBody>
+          <a:bodyPr rot="0" spcFirstLastPara="0" vertOverflow="overflow" horzOverflow="overflow" vert="horz" wrap="square" lIns="63305" tIns="31652" rIns="63305" bIns="31652" numCol="1" spcCol="0" rtlCol="0" fromWordArt="0" anchor="ctr" anchorCtr="0" forceAA="0" compatLnSpc="1">
+            <a:prstTxWarp prst="textNoShape">
+              <a:avLst/>
+            </a:prstTxWarp>
+            <a:noAutofit/>
+          </a:bodyPr>
+          <a:lstStyle/>
+          <a:p>
+            <a:pPr algn="ctr"/>
+            <a:endParaRPr lang="ko-KR" altLang="en-US" sz="1246"/>
+          </a:p>
+        </p:txBody>
+      </p:sp>
+      <p:sp>
+        <p:nvSpPr>
+          <p:cNvPr id="49" name="TextBox 48">
+            <a:extLst>
+              <a:ext uri="{FF2B5EF4-FFF2-40B4-BE49-F238E27FC236}">
+                <a16:creationId xmlns:a16="http://schemas.microsoft.com/office/drawing/2014/main" id="{8DB762F5-0A80-4825-9262-F029E76B1E7A}"/>
+              </a:ext>
+            </a:extLst>
+          </p:cNvPr>
+          <p:cNvSpPr txBox="1"/>
+          <p:nvPr/>
+        </p:nvSpPr>
+        <p:spPr>
+          <a:xfrm>
+            <a:off x="4289763" y="6568480"/>
+            <a:ext cx="3849132" cy="241476"/>
+          </a:xfrm>
+          <a:prstGeom prst="rect">
+            <a:avLst/>
+          </a:prstGeom>
+          <a:noFill/>
+        </p:spPr>
+        <p:txBody>
+          <a:bodyPr wrap="none" rtlCol="0">
+            <a:spAutoFit/>
+          </a:bodyPr>
+          <a:lstStyle/>
+          <a:p>
+            <a:pPr algn="ctr"/>
+            <a:r>
+              <a:rPr lang="ko-KR" altLang="en-US" sz="969" b="1" dirty="0">
+                <a:solidFill>
+                  <a:schemeClr val="bg1"/>
+                </a:solidFill>
+                <a:latin typeface="HY견고딕" panose="02030600000101010101" pitchFamily="18" charset="-127"/>
+                <a:ea typeface="HY견고딕" panose="02030600000101010101" pitchFamily="18" charset="-127"/>
+              </a:rPr>
+              <a:t>리앤리 의원   </a:t>
+            </a:r>
+            <a:r>
+              <a:rPr lang="en-US" altLang="ko-KR" sz="969" b="1" dirty="0">
+                <a:solidFill>
+                  <a:schemeClr val="bg1"/>
+                </a:solidFill>
+                <a:latin typeface="HY견고딕" panose="02030600000101010101" pitchFamily="18" charset="-127"/>
+                <a:ea typeface="HY견고딕" panose="02030600000101010101" pitchFamily="18" charset="-127"/>
+              </a:rPr>
+              <a:t>|   Tel. 02-833-1751   |   www.lnlclinic.co.kr</a:t>
+            </a:r>
+            <a:endParaRPr lang="ko-KR" altLang="en-US" sz="969" b="1" dirty="0">
+              <a:solidFill>
+                <a:schemeClr val="bg1"/>
+              </a:solidFill>
+              <a:latin typeface="HY견고딕" panose="02030600000101010101" pitchFamily="18" charset="-127"/>
+              <a:ea typeface="HY견고딕" panose="02030600000101010101" pitchFamily="18" charset="-127"/>
+            </a:endParaRPr>
+          </a:p>
+        </p:txBody>
+      </p:sp>
+      <p:sp>
+        <p:nvSpPr>
+          <p:cNvPr id="50" name="직사각형 49">
+            <a:extLst>
+              <a:ext uri="{FF2B5EF4-FFF2-40B4-BE49-F238E27FC236}">
+                <a16:creationId xmlns:a16="http://schemas.microsoft.com/office/drawing/2014/main" id="{F44B333E-2973-4594-975A-35B70CBA7A0B}"/>
+              </a:ext>
+            </a:extLst>
+          </p:cNvPr>
+          <p:cNvSpPr/>
+          <p:nvPr/>
+        </p:nvSpPr>
+        <p:spPr>
+          <a:xfrm>
+            <a:off x="3727375" y="11431"/>
+            <a:ext cx="4747846" cy="725104"/>
+          </a:xfrm>
+          <a:prstGeom prst="rect">
+            <a:avLst/>
+          </a:prstGeom>
+          <a:solidFill>
+            <a:srgbClr val="702B77"/>
+          </a:solidFill>
+          <a:ln>
+            <a:noFill/>
+          </a:ln>
+        </p:spPr>
+        <p:style>
+          <a:lnRef idx="2">
+            <a:schemeClr val="accent1">
+              <a:shade val="50000"/>
+            </a:schemeClr>
+          </a:lnRef>
+          <a:fillRef idx="1">
+            <a:schemeClr val="accent1"/>
+          </a:fillRef>
+          <a:effectRef idx="0">
+            <a:schemeClr val="accent1"/>
+          </a:effectRef>
+          <a:fontRef idx="minor">
+            <a:schemeClr val="lt1"/>
+          </a:fontRef>
+        </p:style>
+        <p:txBody>
+          <a:bodyPr rot="0" spcFirstLastPara="0" vertOverflow="overflow" horzOverflow="overflow" vert="horz" wrap="square" lIns="63305" tIns="31652" rIns="63305" bIns="31652" numCol="1" spcCol="0" rtlCol="0" fromWordArt="0" anchor="ctr" anchorCtr="0" forceAA="0" compatLnSpc="1">
+            <a:prstTxWarp prst="textNoShape">
+              <a:avLst/>
+            </a:prstTxWarp>
+            <a:noAutofit/>
+          </a:bodyPr>
+          <a:lstStyle/>
+          <a:p>
+            <a:pPr algn="ctr"/>
+            <a:endParaRPr lang="ko-KR" altLang="en-US" sz="1246"/>
+          </a:p>
+        </p:txBody>
+      </p:sp>
+      <p:sp>
+        <p:nvSpPr>
+          <p:cNvPr id="9" name="TextBox 8">
+            <a:extLst>
+              <a:ext uri="{FF2B5EF4-FFF2-40B4-BE49-F238E27FC236}">
+                <a16:creationId xmlns:a16="http://schemas.microsoft.com/office/drawing/2014/main" id="{92004084-AEFE-49BA-A26E-88A6A1D275CC}"/>
+              </a:ext>
+            </a:extLst>
+          </p:cNvPr>
+          <p:cNvSpPr txBox="1"/>
+          <p:nvPr/>
+        </p:nvSpPr>
+        <p:spPr>
+          <a:xfrm>
+            <a:off x="3943486" y="116145"/>
+            <a:ext cx="4305026" cy="518475"/>
+          </a:xfrm>
+          <a:prstGeom prst="rect">
+            <a:avLst/>
+          </a:prstGeom>
+          <a:noFill/>
+        </p:spPr>
+        <p:txBody>
+          <a:bodyPr wrap="none" rtlCol="0">
+            <a:spAutoFit/>
+          </a:bodyPr>
+          <a:lstStyle/>
+          <a:p>
+            <a:pPr algn="ctr"/>
+            <a:r>
+              <a:rPr lang="ko-KR" altLang="en-US" sz="2769" b="1" spc="-208" dirty="0">
+                <a:solidFill>
+                  <a:schemeClr val="bg1">
+                    <a:lumMod val="95000"/>
+                  </a:schemeClr>
+                </a:solidFill>
+                <a:latin typeface="HY엽서M" panose="02030600000101010101" pitchFamily="18" charset="-127"/>
+                <a:ea typeface="HY엽서M" panose="02030600000101010101" pitchFamily="18" charset="-127"/>
+              </a:rPr>
+              <a:t>올인원 미백시술 후 주의사항</a:t>
+            </a:r>
+          </a:p>
+        </p:txBody>
+      </p:sp>
+    </p:spTree>
+    <p:extLst>
+      <p:ext uri="{BB962C8B-B14F-4D97-AF65-F5344CB8AC3E}">
+        <p14:creationId xmlns:p14="http://schemas.microsoft.com/office/powerpoint/2010/main" val="3544367277"/>
+      </p:ext>
+    </p:extLst>
+  </p:cSld>
+  <p:clrMapOvr>
+    <a:masterClrMapping/>
+  </p:clrMapOvr>
+</p:sld>
+</file>
+
 <file path=ppt/theme/theme1.xml><?xml version="1.0" encoding="utf-8"?>
 <a:theme xmlns:a="http://schemas.openxmlformats.org/drawingml/2006/main" name="Office 테마">
   <a:themeElements>
@@ -7725,4 +10179,299 @@
     </a:ext>
   </a:extLst>
 </a:theme>
+</file>
+
+<file path=ppt/theme/theme2.xml><?xml version="1.0" encoding="utf-8"?>
+<a:theme xmlns:a="http://schemas.openxmlformats.org/drawingml/2006/main" name="Office 테마">
+  <a:themeElements>
+    <a:clrScheme name="Office">
+      <a:dk1>
+        <a:sysClr val="windowText" lastClr="000000"/>
+      </a:dk1>
+      <a:lt1>
+        <a:sysClr val="window" lastClr="FFFFFF"/>
+      </a:lt1>
+      <a:dk2>
+        <a:srgbClr val="44546A"/>
+      </a:dk2>
+      <a:lt2>
+        <a:srgbClr val="E7E6E6"/>
+      </a:lt2>
+      <a:accent1>
+        <a:srgbClr val="4472C4"/>
+      </a:accent1>
+      <a:accent2>
+        <a:srgbClr val="ED7D31"/>
+      </a:accent2>
+      <a:accent3>
+        <a:srgbClr val="A5A5A5"/>
+      </a:accent3>
+      <a:accent4>
+        <a:srgbClr val="FFC000"/>
+      </a:accent4>
+      <a:accent5>
+        <a:srgbClr val="5B9BD5"/>
+      </a:accent5>
+      <a:accent6>
+        <a:srgbClr val="70AD47"/>
+      </a:accent6>
+      <a:hlink>
+        <a:srgbClr val="0563C1"/>
+      </a:hlink>
+      <a:folHlink>
+        <a:srgbClr val="954F72"/>
+      </a:folHlink>
+    </a:clrScheme>
+    <a:fontScheme name="Office">
+      <a:majorFont>
+        <a:latin typeface="맑은 고딕" panose="020F0302020204030204"/>
+        <a:ea typeface=""/>
+        <a:cs typeface=""/>
+        <a:font script="Jpan" typeface="游ゴシック Light"/>
+        <a:font script="Hang" typeface="맑은 고딕"/>
+        <a:font script="Hans" typeface="等线 Light"/>
+        <a:font script="Hant" typeface="新細明體"/>
+        <a:font script="Arab" typeface="Times New Roman"/>
+        <a:font script="Hebr" typeface="Times New Roman"/>
+        <a:font script="Thai" typeface="Angsana New"/>
+        <a:font script="Ethi" typeface="Nyala"/>
+        <a:font script="Beng" typeface="Vrinda"/>
+        <a:font script="Gujr" typeface="Shruti"/>
+        <a:font script="Khmr" typeface="MoolBoran"/>
+        <a:font script="Knda" typeface="Tunga"/>
+        <a:font script="Guru" typeface="Raavi"/>
+        <a:font script="Cans" typeface="Euphemia"/>
+        <a:font script="Cher" typeface="Plantagenet Cherokee"/>
+        <a:font script="Yiii" typeface="Microsoft Yi Baiti"/>
+        <a:font script="Tibt" typeface="Microsoft Himalaya"/>
+        <a:font script="Thaa" typeface="MV Boli"/>
+        <a:font script="Deva" typeface="Mangal"/>
+        <a:font script="Telu" typeface="Gautami"/>
+        <a:font script="Taml" typeface="Latha"/>
+        <a:font script="Syrc" typeface="Estrangelo Edessa"/>
+        <a:font script="Orya" typeface="Kalinga"/>
+        <a:font script="Mlym" typeface="Kartika"/>
+        <a:font script="Laoo" typeface="DokChampa"/>
+        <a:font script="Sinh" typeface="Iskoola Pota"/>
+        <a:font script="Mong" typeface="Mongolian Baiti"/>
+        <a:font script="Viet" typeface="Times New Roman"/>
+        <a:font script="Uigh" typeface="Microsoft Uighur"/>
+        <a:font script="Geor" typeface="Sylfaen"/>
+        <a:font script="Armn" typeface="Arial"/>
+        <a:font script="Bugi" typeface="Leelawadee UI"/>
+        <a:font script="Bopo" typeface="Microsoft JhengHei"/>
+        <a:font script="Java" typeface="Javanese Text"/>
+        <a:font script="Lisu" typeface="Segoe UI"/>
+        <a:font script="Mymr" typeface="Myanmar Text"/>
+        <a:font script="Nkoo" typeface="Ebrima"/>
+        <a:font script="Olck" typeface="Nirmala UI"/>
+        <a:font script="Osma" typeface="Ebrima"/>
+        <a:font script="Phag" typeface="Phagspa"/>
+        <a:font script="Syrn" typeface="Estrangelo Edessa"/>
+        <a:font script="Syrj" typeface="Estrangelo Edessa"/>
+        <a:font script="Syre" typeface="Estrangelo Edessa"/>
+        <a:font script="Sora" typeface="Nirmala UI"/>
+        <a:font script="Tale" typeface="Microsoft Tai Le"/>
+        <a:font script="Talu" typeface="Microsoft New Tai Lue"/>
+        <a:font script="Tfng" typeface="Ebrima"/>
+      </a:majorFont>
+      <a:minorFont>
+        <a:latin typeface="맑은 고딕" panose="020F0502020204030204"/>
+        <a:ea typeface=""/>
+        <a:cs typeface=""/>
+        <a:font script="Jpan" typeface="游ゴシック"/>
+        <a:font script="Hang" typeface="맑은 고딕"/>
+        <a:font script="Hans" typeface="等线"/>
+        <a:font script="Hant" typeface="新細明體"/>
+        <a:font script="Arab" typeface="Arial"/>
+        <a:font script="Hebr" typeface="Arial"/>
+        <a:font script="Thai" typeface="Cordia New"/>
+        <a:font script="Ethi" typeface="Nyala"/>
+        <a:font script="Beng" typeface="Vrinda"/>
+        <a:font script="Gujr" typeface="Shruti"/>
+        <a:font script="Khmr" typeface="DaunPenh"/>
+        <a:font script="Knda" typeface="Tunga"/>
+        <a:font script="Guru" typeface="Raavi"/>
+        <a:font script="Cans" typeface="Euphemia"/>
+        <a:font script="Cher" typeface="Plantagenet Cherokee"/>
+        <a:font script="Yiii" typeface="Microsoft Yi Baiti"/>
+        <a:font script="Tibt" typeface="Microsoft Himalaya"/>
+        <a:font script="Thaa" typeface="MV Boli"/>
+        <a:font script="Deva" typeface="Mangal"/>
+        <a:font script="Telu" typeface="Gautami"/>
+        <a:font script="Taml" typeface="Latha"/>
+        <a:font script="Syrc" typeface="Estrangelo Edessa"/>
+        <a:font script="Orya" typeface="Kalinga"/>
+        <a:font script="Mlym" typeface="Kartika"/>
+        <a:font script="Laoo" typeface="DokChampa"/>
+        <a:font script="Sinh" typeface="Iskoola Pota"/>
+        <a:font script="Mong" typeface="Mongolian Baiti"/>
+        <a:font script="Viet" typeface="Arial"/>
+        <a:font script="Uigh" typeface="Microsoft Uighur"/>
+        <a:font script="Geor" typeface="Sylfaen"/>
+        <a:font script="Armn" typeface="Arial"/>
+        <a:font script="Bugi" typeface="Leelawadee UI"/>
+        <a:font script="Bopo" typeface="Microsoft JhengHei"/>
+        <a:font script="Java" typeface="Javanese Text"/>
+        <a:font script="Lisu" typeface="Segoe UI"/>
+        <a:font script="Mymr" typeface="Myanmar Text"/>
+        <a:font script="Nkoo" typeface="Ebrima"/>
+        <a:font script="Olck" typeface="Nirmala UI"/>
+        <a:font script="Osma" typeface="Ebrima"/>
+        <a:font script="Phag" typeface="Phagspa"/>
+        <a:font script="Syrn" typeface="Estrangelo Edessa"/>
+        <a:font script="Syrj" typeface="Estrangelo Edessa"/>
+        <a:font script="Syre" typeface="Estrangelo Edessa"/>
+        <a:font script="Sora" typeface="Nirmala UI"/>
+        <a:font script="Tale" typeface="Microsoft Tai Le"/>
+        <a:font script="Talu" typeface="Microsoft New Tai Lue"/>
+        <a:font script="Tfng" typeface="Ebrima"/>
+      </a:minorFont>
+    </a:fontScheme>
+    <a:fmtScheme name="Office">
+      <a:fillStyleLst>
+        <a:solidFill>
+          <a:schemeClr val="phClr"/>
+        </a:solidFill>
+        <a:gradFill rotWithShape="1">
+          <a:gsLst>
+            <a:gs pos="0">
+              <a:schemeClr val="phClr">
+                <a:lumMod val="110000"/>
+                <a:satMod val="105000"/>
+                <a:tint val="67000"/>
+              </a:schemeClr>
+            </a:gs>
+            <a:gs pos="50000">
+              <a:schemeClr val="phClr">
+                <a:lumMod val="105000"/>
+                <a:satMod val="103000"/>
+                <a:tint val="73000"/>
+              </a:schemeClr>
+            </a:gs>
+            <a:gs pos="100000">
+              <a:schemeClr val="phClr">
+                <a:lumMod val="105000"/>
+                <a:satMod val="109000"/>
+                <a:tint val="81000"/>
+              </a:schemeClr>
+            </a:gs>
+          </a:gsLst>
+          <a:lin ang="5400000" scaled="0"/>
+        </a:gradFill>
+        <a:gradFill rotWithShape="1">
+          <a:gsLst>
+            <a:gs pos="0">
+              <a:schemeClr val="phClr">
+                <a:satMod val="103000"/>
+                <a:lumMod val="102000"/>
+                <a:tint val="94000"/>
+              </a:schemeClr>
+            </a:gs>
+            <a:gs pos="50000">
+              <a:schemeClr val="phClr">
+                <a:satMod val="110000"/>
+                <a:lumMod val="100000"/>
+                <a:shade val="100000"/>
+              </a:schemeClr>
+            </a:gs>
+            <a:gs pos="100000">
+              <a:schemeClr val="phClr">
+                <a:lumMod val="99000"/>
+                <a:satMod val="120000"/>
+                <a:shade val="78000"/>
+              </a:schemeClr>
+            </a:gs>
+          </a:gsLst>
+          <a:lin ang="5400000" scaled="0"/>
+        </a:gradFill>
+      </a:fillStyleLst>
+      <a:lnStyleLst>
+        <a:ln w="6350" cap="flat" cmpd="sng" algn="ctr">
+          <a:solidFill>
+            <a:schemeClr val="phClr"/>
+          </a:solidFill>
+          <a:prstDash val="solid"/>
+          <a:miter lim="800000"/>
+        </a:ln>
+        <a:ln w="12700" cap="flat" cmpd="sng" algn="ctr">
+          <a:solidFill>
+            <a:schemeClr val="phClr"/>
+          </a:solidFill>
+          <a:prstDash val="solid"/>
+          <a:miter lim="800000"/>
+        </a:ln>
+        <a:ln w="19050" cap="flat" cmpd="sng" algn="ctr">
+          <a:solidFill>
+            <a:schemeClr val="phClr"/>
+          </a:solidFill>
+          <a:prstDash val="solid"/>
+          <a:miter lim="800000"/>
+        </a:ln>
+      </a:lnStyleLst>
+      <a:effectStyleLst>
+        <a:effectStyle>
+          <a:effectLst/>
+        </a:effectStyle>
+        <a:effectStyle>
+          <a:effectLst/>
+        </a:effectStyle>
+        <a:effectStyle>
+          <a:effectLst>
+            <a:outerShdw blurRad="57150" dist="19050" dir="5400000" algn="ctr" rotWithShape="0">
+              <a:srgbClr val="000000">
+                <a:alpha val="63000"/>
+              </a:srgbClr>
+            </a:outerShdw>
+          </a:effectLst>
+        </a:effectStyle>
+      </a:effectStyleLst>
+      <a:bgFillStyleLst>
+        <a:solidFill>
+          <a:schemeClr val="phClr"/>
+        </a:solidFill>
+        <a:solidFill>
+          <a:schemeClr val="phClr">
+            <a:tint val="95000"/>
+            <a:satMod val="170000"/>
+          </a:schemeClr>
+        </a:solidFill>
+        <a:gradFill rotWithShape="1">
+          <a:gsLst>
+            <a:gs pos="0">
+              <a:schemeClr val="phClr">
+                <a:tint val="93000"/>
+                <a:satMod val="150000"/>
+                <a:shade val="98000"/>
+                <a:lumMod val="102000"/>
+              </a:schemeClr>
+            </a:gs>
+            <a:gs pos="50000">
+              <a:schemeClr val="phClr">
+                <a:tint val="98000"/>
+                <a:satMod val="130000"/>
+                <a:shade val="90000"/>
+                <a:lumMod val="103000"/>
+              </a:schemeClr>
+            </a:gs>
+            <a:gs pos="100000">
+              <a:schemeClr val="phClr">
+                <a:shade val="63000"/>
+                <a:satMod val="120000"/>
+              </a:schemeClr>
+            </a:gs>
+          </a:gsLst>
+          <a:lin ang="5400000" scaled="0"/>
+        </a:gradFill>
+      </a:bgFillStyleLst>
+    </a:fmtScheme>
+  </a:themeElements>
+  <a:objectDefaults/>
+  <a:extraClrSchemeLst/>
+  <a:extLst>
+    <a:ext uri="{05A4C25C-085E-4340-85A3-A5531E510DB2}">
+      <thm15:themeFamily xmlns:thm15="http://schemas.microsoft.com/office/thememl/2012/main" name="Office Theme" id="{62F939B6-93AF-4DB8-9C6B-D6C7DFDC589F}" vid="{4A3C46E8-61CC-4603-A589-7422A47A8E4A}"/>
+    </a:ext>
+  </a:extLst>
+</a:theme>
 </file>
</xml_diff>